<commit_message>
Added the answer for the 3 question.
</commit_message>
<xml_diff>
--- a/doc/SingtelIOT_Progress_19_09_2019_LiuYuancheng.pptx
+++ b/doc/SingtelIOT_Progress_19_09_2019_LiuYuancheng.pptx
@@ -10,7 +10,7 @@
   <p:sldIdLst>
     <p:sldId id="260" r:id="rId2"/>
     <p:sldId id="257" r:id="rId3"/>
-    <p:sldId id="259" r:id="rId4"/>
+    <p:sldId id="261" r:id="rId4"/>
   </p:sldIdLst>
   <p:sldSz cx="12192000" cy="6858000"/>
   <p:notesSz cx="6858000" cy="9144000"/>
@@ -199,7 +199,7 @@
           <a:p>
             <a:fld id="{BC02A1FE-92B0-47DA-8D83-FD3264FE7FF1}" type="datetimeFigureOut">
               <a:rPr lang="en-SG" smtClean="0"/>
-              <a:t>19/9/2019</a:t>
+              <a:t>24/9/2019</a:t>
             </a:fld>
             <a:endParaRPr lang="en-SG" dirty="0"/>
           </a:p>
@@ -660,7 +660,7 @@
       </p:grpSpPr>
       <p:sp>
         <p:nvSpPr>
-          <p:cNvPr id="2" name="Slide Image Placeholder 1"/>
+          <p:cNvPr id="2" name="幻灯片图像占位符 1"/>
           <p:cNvSpPr>
             <a:spLocks noGrp="1" noRot="1" noChangeAspect="1"/>
           </p:cNvSpPr>
@@ -672,7 +672,7 @@
       </p:sp>
       <p:sp>
         <p:nvSpPr>
-          <p:cNvPr id="3" name="Notes Placeholder 2"/>
+          <p:cNvPr id="3" name="备注占位符 2"/>
           <p:cNvSpPr>
             <a:spLocks noGrp="1"/>
           </p:cNvSpPr>
@@ -682,40 +682,43 @@
         </p:nvSpPr>
         <p:spPr/>
         <p:txBody>
+          <a:bodyPr>
+            <a:normAutofit/>
+          </a:bodyPr>
+          <a:lstStyle/>
+          <a:p>
+            <a:endParaRPr lang="zh-CN" altLang="en-US" dirty="0"/>
+          </a:p>
+        </p:txBody>
+      </p:sp>
+      <p:sp>
+        <p:nvSpPr>
+          <p:cNvPr id="4" name="灯片编号占位符 3"/>
+          <p:cNvSpPr>
+            <a:spLocks noGrp="1"/>
+          </p:cNvSpPr>
+          <p:nvPr>
+            <p:ph type="sldNum" sz="quarter" idx="10"/>
+          </p:nvPr>
+        </p:nvSpPr>
+        <p:spPr/>
+        <p:txBody>
           <a:bodyPr/>
           <a:lstStyle/>
           <a:p>
-            <a:endParaRPr lang="en-SG" dirty="0"/>
-          </a:p>
-        </p:txBody>
-      </p:sp>
-      <p:sp>
-        <p:nvSpPr>
-          <p:cNvPr id="4" name="Slide Number Placeholder 3"/>
-          <p:cNvSpPr>
-            <a:spLocks noGrp="1"/>
-          </p:cNvSpPr>
-          <p:nvPr>
-            <p:ph type="sldNum" sz="quarter" idx="10"/>
-          </p:nvPr>
-        </p:nvSpPr>
-        <p:spPr/>
-        <p:txBody>
-          <a:bodyPr/>
-          <a:lstStyle/>
-          <a:p>
-            <a:fld id="{620E605A-E658-4718-A0B0-0E0D18691EE8}" type="slidenum">
-              <a:rPr lang="en-SG" smtClean="0"/>
+            <a:fld id="{537E733D-3438-4EDD-B982-BE86B357DA39}" type="slidenum">
+              <a:rPr lang="zh-CN" altLang="en-US" smtClean="0"/>
+              <a:pPr/>
               <a:t>3</a:t>
             </a:fld>
-            <a:endParaRPr lang="en-SG"/>
+            <a:endParaRPr lang="zh-CN" altLang="en-US"/>
           </a:p>
         </p:txBody>
       </p:sp>
     </p:spTree>
     <p:extLst>
       <p:ext uri="{BB962C8B-B14F-4D97-AF65-F5344CB8AC3E}">
-        <p14:creationId xmlns:p14="http://schemas.microsoft.com/office/powerpoint/2010/main" val="387449985"/>
+        <p14:creationId xmlns:p14="http://schemas.microsoft.com/office/powerpoint/2010/main" val="1724910279"/>
       </p:ext>
     </p:extLst>
   </p:cSld>
@@ -856,7 +859,7 @@
           <a:p>
             <a:fld id="{EFC67413-6A79-4906-82BE-ABBFD7468337}" type="datetimeFigureOut">
               <a:rPr lang="en-SG" smtClean="0"/>
-              <a:t>19/9/2019</a:t>
+              <a:t>24/9/2019</a:t>
             </a:fld>
             <a:endParaRPr lang="en-SG" dirty="0"/>
           </a:p>
@@ -1026,7 +1029,7 @@
           <a:p>
             <a:fld id="{EFC67413-6A79-4906-82BE-ABBFD7468337}" type="datetimeFigureOut">
               <a:rPr lang="en-SG" smtClean="0"/>
-              <a:t>19/9/2019</a:t>
+              <a:t>24/9/2019</a:t>
             </a:fld>
             <a:endParaRPr lang="en-SG" dirty="0"/>
           </a:p>
@@ -1206,7 +1209,7 @@
           <a:p>
             <a:fld id="{EFC67413-6A79-4906-82BE-ABBFD7468337}" type="datetimeFigureOut">
               <a:rPr lang="en-SG" smtClean="0"/>
-              <a:t>19/9/2019</a:t>
+              <a:t>24/9/2019</a:t>
             </a:fld>
             <a:endParaRPr lang="en-SG" dirty="0"/>
           </a:p>
@@ -1376,7 +1379,7 @@
           <a:p>
             <a:fld id="{EFC67413-6A79-4906-82BE-ABBFD7468337}" type="datetimeFigureOut">
               <a:rPr lang="en-SG" smtClean="0"/>
-              <a:t>19/9/2019</a:t>
+              <a:t>24/9/2019</a:t>
             </a:fld>
             <a:endParaRPr lang="en-SG" dirty="0"/>
           </a:p>
@@ -1622,7 +1625,7 @@
           <a:p>
             <a:fld id="{EFC67413-6A79-4906-82BE-ABBFD7468337}" type="datetimeFigureOut">
               <a:rPr lang="en-SG" smtClean="0"/>
-              <a:t>19/9/2019</a:t>
+              <a:t>24/9/2019</a:t>
             </a:fld>
             <a:endParaRPr lang="en-SG" dirty="0"/>
           </a:p>
@@ -1854,7 +1857,7 @@
           <a:p>
             <a:fld id="{EFC67413-6A79-4906-82BE-ABBFD7468337}" type="datetimeFigureOut">
               <a:rPr lang="en-SG" smtClean="0"/>
-              <a:t>19/9/2019</a:t>
+              <a:t>24/9/2019</a:t>
             </a:fld>
             <a:endParaRPr lang="en-SG" dirty="0"/>
           </a:p>
@@ -2221,7 +2224,7 @@
           <a:p>
             <a:fld id="{EFC67413-6A79-4906-82BE-ABBFD7468337}" type="datetimeFigureOut">
               <a:rPr lang="en-SG" smtClean="0"/>
-              <a:t>19/9/2019</a:t>
+              <a:t>24/9/2019</a:t>
             </a:fld>
             <a:endParaRPr lang="en-SG" dirty="0"/>
           </a:p>
@@ -2339,7 +2342,7 @@
           <a:p>
             <a:fld id="{EFC67413-6A79-4906-82BE-ABBFD7468337}" type="datetimeFigureOut">
               <a:rPr lang="en-SG" smtClean="0"/>
-              <a:t>19/9/2019</a:t>
+              <a:t>24/9/2019</a:t>
             </a:fld>
             <a:endParaRPr lang="en-SG" dirty="0"/>
           </a:p>
@@ -2434,7 +2437,7 @@
           <a:p>
             <a:fld id="{EFC67413-6A79-4906-82BE-ABBFD7468337}" type="datetimeFigureOut">
               <a:rPr lang="en-SG" smtClean="0"/>
-              <a:t>19/9/2019</a:t>
+              <a:t>24/9/2019</a:t>
             </a:fld>
             <a:endParaRPr lang="en-SG" dirty="0"/>
           </a:p>
@@ -2711,7 +2714,7 @@
           <a:p>
             <a:fld id="{EFC67413-6A79-4906-82BE-ABBFD7468337}" type="datetimeFigureOut">
               <a:rPr lang="en-SG" smtClean="0"/>
-              <a:t>19/9/2019</a:t>
+              <a:t>24/9/2019</a:t>
             </a:fld>
             <a:endParaRPr lang="en-SG" dirty="0"/>
           </a:p>
@@ -2964,7 +2967,7 @@
           <a:p>
             <a:fld id="{EFC67413-6A79-4906-82BE-ABBFD7468337}" type="datetimeFigureOut">
               <a:rPr lang="en-SG" smtClean="0"/>
-              <a:t>19/9/2019</a:t>
+              <a:t>24/9/2019</a:t>
             </a:fld>
             <a:endParaRPr lang="en-SG" dirty="0"/>
           </a:p>
@@ -3177,7 +3180,7 @@
           <a:p>
             <a:fld id="{EFC67413-6A79-4906-82BE-ABBFD7468337}" type="datetimeFigureOut">
               <a:rPr lang="en-SG" smtClean="0"/>
-              <a:t>19/9/2019</a:t>
+              <a:t>24/9/2019</a:t>
             </a:fld>
             <a:endParaRPr lang="en-SG" dirty="0"/>
           </a:p>
@@ -3915,8 +3918,8 @@
         </p:blipFill>
         <p:spPr>
           <a:xfrm>
-            <a:off x="8209157" y="1109551"/>
-            <a:ext cx="3376106" cy="2611897"/>
+            <a:off x="7790464" y="1562749"/>
+            <a:ext cx="3309237" cy="2560164"/>
           </a:xfrm>
           <a:prstGeom prst="rect">
             <a:avLst/>
@@ -3945,8 +3948,8 @@
         </p:blipFill>
         <p:spPr>
           <a:xfrm>
-            <a:off x="4254196" y="1124174"/>
-            <a:ext cx="3624191" cy="2632386"/>
+            <a:off x="4121318" y="1562748"/>
+            <a:ext cx="3526392" cy="2561351"/>
           </a:xfrm>
           <a:prstGeom prst="rect">
             <a:avLst/>
@@ -3975,8 +3978,8 @@
         </p:blipFill>
         <p:spPr>
           <a:xfrm>
-            <a:off x="382732" y="1109551"/>
-            <a:ext cx="3644323" cy="2647009"/>
+            <a:off x="502298" y="1562748"/>
+            <a:ext cx="3524757" cy="2560164"/>
           </a:xfrm>
           <a:prstGeom prst="rect">
             <a:avLst/>
@@ -4005,8 +4008,8 @@
         </p:blipFill>
         <p:spPr>
           <a:xfrm>
-            <a:off x="382732" y="4024361"/>
-            <a:ext cx="3644323" cy="2459568"/>
+            <a:off x="476994" y="4252041"/>
+            <a:ext cx="3550061" cy="2395950"/>
           </a:xfrm>
           <a:prstGeom prst="rect">
             <a:avLst/>
@@ -4035,8 +4038,8 @@
         </p:blipFill>
         <p:spPr>
           <a:xfrm>
-            <a:off x="4254197" y="4024361"/>
-            <a:ext cx="3729448" cy="2434065"/>
+            <a:off x="4121317" y="4249964"/>
+            <a:ext cx="3526393" cy="2410046"/>
           </a:xfrm>
           <a:prstGeom prst="rect">
             <a:avLst/>
@@ -4065,14 +4068,58 @@
         </p:blipFill>
         <p:spPr>
           <a:xfrm>
-            <a:off x="8209157" y="4024360"/>
-            <a:ext cx="3376106" cy="2434065"/>
+            <a:off x="7790464" y="4249964"/>
+            <a:ext cx="3326120" cy="2398027"/>
           </a:xfrm>
           <a:prstGeom prst="rect">
             <a:avLst/>
           </a:prstGeom>
         </p:spPr>
       </p:pic>
+      <p:sp>
+        <p:nvSpPr>
+          <p:cNvPr id="3" name="Rectangle 2"/>
+          <p:cNvSpPr/>
+          <p:nvPr/>
+        </p:nvSpPr>
+        <p:spPr>
+          <a:xfrm>
+            <a:off x="502298" y="1098074"/>
+            <a:ext cx="6096000" cy="338554"/>
+          </a:xfrm>
+          <a:prstGeom prst="rect">
+            <a:avLst/>
+          </a:prstGeom>
+        </p:spPr>
+        <p:txBody>
+          <a:bodyPr>
+            <a:spAutoFit/>
+          </a:bodyPr>
+          <a:lstStyle/>
+          <a:p>
+            <a:pPr marL="342900" indent="-342900">
+              <a:buAutoNum type="arabicPeriod"/>
+            </a:pPr>
+            <a:r>
+              <a:rPr lang="en-SG" sz="1600" b="1" dirty="0" err="1" smtClean="0"/>
+              <a:t>IoT</a:t>
+            </a:r>
+            <a:r>
+              <a:rPr lang="en-SG" sz="1600" b="1" dirty="0" smtClean="0"/>
+              <a:t> People counting </a:t>
+            </a:r>
+            <a:r>
+              <a:rPr lang="en-SG" sz="1600" b="1" dirty="0"/>
+              <a:t>s</a:t>
+            </a:r>
+            <a:r>
+              <a:rPr lang="en-SG" sz="1600" b="1" dirty="0" smtClean="0"/>
+              <a:t>ensor reader program. </a:t>
+            </a:r>
+            <a:endParaRPr lang="en-SG" sz="1600" b="1" dirty="0"/>
+          </a:p>
+        </p:txBody>
+      </p:sp>
     </p:spTree>
     <p:extLst>
       <p:ext uri="{BB962C8B-B14F-4D97-AF65-F5344CB8AC3E}">
@@ -4443,14 +4490,170 @@
         </p:blipFill>
         <p:spPr>
           <a:xfrm>
-            <a:off x="1406484" y="1109551"/>
-            <a:ext cx="9538606" cy="5366776"/>
+            <a:off x="122146" y="1485347"/>
+            <a:ext cx="8255236" cy="4644704"/>
           </a:xfrm>
           <a:prstGeom prst="rect">
             <a:avLst/>
           </a:prstGeom>
         </p:spPr>
       </p:pic>
+      <p:sp>
+        <p:nvSpPr>
+          <p:cNvPr id="2" name="TextBox 1"/>
+          <p:cNvSpPr txBox="1"/>
+          <p:nvPr/>
+        </p:nvSpPr>
+        <p:spPr>
+          <a:xfrm>
+            <a:off x="8377382" y="3144379"/>
+            <a:ext cx="3602182" cy="3323987"/>
+          </a:xfrm>
+          <a:prstGeom prst="rect">
+            <a:avLst/>
+          </a:prstGeom>
+          <a:noFill/>
+        </p:spPr>
+        <p:txBody>
+          <a:bodyPr wrap="square" rtlCol="0">
+            <a:spAutoFit/>
+          </a:bodyPr>
+          <a:lstStyle/>
+          <a:p>
+            <a:pPr marL="342900" indent="-342900">
+              <a:buAutoNum type="arabicPeriod"/>
+            </a:pPr>
+            <a:r>
+              <a:rPr lang="en-SG" sz="1400" b="1" dirty="0" smtClean="0"/>
+              <a:t>What </a:t>
+            </a:r>
+            <a:r>
+              <a:rPr lang="en-SG" sz="1400" b="1" dirty="0"/>
+              <a:t>is </a:t>
+            </a:r>
+            <a:r>
+              <a:rPr lang="en-SG" sz="1400" b="1" dirty="0" smtClean="0"/>
+              <a:t>the demo:</a:t>
+            </a:r>
+          </a:p>
+          <a:p>
+            <a:r>
+              <a:rPr lang="en-SG" sz="1400" dirty="0" smtClean="0"/>
+              <a:t>Device </a:t>
+            </a:r>
+            <a:r>
+              <a:rPr lang="en-SG" sz="1400" dirty="0"/>
+              <a:t>Manufacturer Initial Firmware </a:t>
+            </a:r>
+            <a:r>
+              <a:rPr lang="en-SG" sz="1400" dirty="0" smtClean="0"/>
+              <a:t>Flashing</a:t>
+            </a:r>
+          </a:p>
+          <a:p>
+            <a:endParaRPr lang="en-SG" sz="1400" dirty="0" smtClean="0"/>
+          </a:p>
+          <a:p>
+            <a:r>
+              <a:rPr lang="en-US" sz="1400" b="1" dirty="0" smtClean="0"/>
+              <a:t>2. </a:t>
+            </a:r>
+            <a:r>
+              <a:rPr lang="en-SG" sz="1400" b="1" dirty="0"/>
+              <a:t>how does it </a:t>
+            </a:r>
+            <a:r>
+              <a:rPr lang="en-SG" sz="1400" b="1" dirty="0" smtClean="0"/>
+              <a:t>work: </a:t>
+            </a:r>
+          </a:p>
+          <a:p>
+            <a:r>
+              <a:rPr lang="en-SG" sz="1400" dirty="0" smtClean="0"/>
+              <a:t>When </a:t>
+            </a:r>
+            <a:r>
+              <a:rPr lang="en-SG" sz="1400" dirty="0"/>
+              <a:t>the IOT device manufacturers flashing the firmware into the IOT device’s ROM chip, we add a signature generation step to create a unique firmware signature to every flashed firmware copy. This signature verification feature will avoid the attacker to create a fake IOT device and connect to our server even he has got the IOT firmware sample, the firmware flashing program or an unused IOT device (such as an old sensor which was not used anymore</a:t>
+            </a:r>
+            <a:r>
+              <a:rPr lang="en-SG" sz="1400" dirty="0" smtClean="0"/>
+              <a:t>).</a:t>
+            </a:r>
+            <a:endParaRPr lang="en-SG" sz="1400" dirty="0"/>
+          </a:p>
+        </p:txBody>
+      </p:sp>
+      <p:pic>
+        <p:nvPicPr>
+          <p:cNvPr id="4" name="Picture 3"/>
+          <p:cNvPicPr>
+            <a:picLocks noChangeAspect="1"/>
+          </p:cNvPicPr>
+          <p:nvPr/>
+        </p:nvPicPr>
+        <p:blipFill>
+          <a:blip r:embed="rId5">
+            <a:extLst>
+              <a:ext uri="{28A0092B-C50C-407E-A947-70E740481C1C}">
+                <a14:useLocalDpi xmlns:a14="http://schemas.microsoft.com/office/drawing/2010/main" val="0"/>
+              </a:ext>
+            </a:extLst>
+          </a:blip>
+          <a:stretch>
+            <a:fillRect/>
+          </a:stretch>
+        </p:blipFill>
+        <p:spPr>
+          <a:xfrm>
+            <a:off x="8469944" y="1187260"/>
+            <a:ext cx="3619303" cy="1602122"/>
+          </a:xfrm>
+          <a:prstGeom prst="rect">
+            <a:avLst/>
+          </a:prstGeom>
+        </p:spPr>
+      </p:pic>
+      <p:sp>
+        <p:nvSpPr>
+          <p:cNvPr id="14" name="Rectangle 13"/>
+          <p:cNvSpPr/>
+          <p:nvPr/>
+        </p:nvSpPr>
+        <p:spPr>
+          <a:xfrm>
+            <a:off x="502298" y="1098074"/>
+            <a:ext cx="6096000" cy="338554"/>
+          </a:xfrm>
+          <a:prstGeom prst="rect">
+            <a:avLst/>
+          </a:prstGeom>
+        </p:spPr>
+        <p:txBody>
+          <a:bodyPr>
+            <a:spAutoFit/>
+          </a:bodyPr>
+          <a:lstStyle/>
+          <a:p>
+            <a:r>
+              <a:rPr lang="en-SG" sz="1600" b="1" dirty="0" smtClean="0"/>
+              <a:t>2. </a:t>
+            </a:r>
+            <a:r>
+              <a:rPr lang="en-SG" sz="1600" b="1" dirty="0" err="1" smtClean="0"/>
+              <a:t>IoT</a:t>
+            </a:r>
+            <a:r>
+              <a:rPr lang="en-SG" sz="1600" b="1" dirty="0" smtClean="0"/>
+              <a:t> </a:t>
+            </a:r>
+            <a:r>
+              <a:rPr lang="en-SG" sz="1600" b="1" dirty="0"/>
+              <a:t>firmware attestation (Protocol)</a:t>
+            </a:r>
+          </a:p>
+        </p:txBody>
+      </p:sp>
     </p:spTree>
     <p:extLst>
       <p:ext uri="{BB962C8B-B14F-4D97-AF65-F5344CB8AC3E}">
@@ -4490,865 +4693,69 @@
       </p:grpSpPr>
       <p:sp>
         <p:nvSpPr>
-          <p:cNvPr id="16" name="Rectangle 15"/>
-          <p:cNvSpPr/>
+          <p:cNvPr id="9" name="文本框 8"/>
+          <p:cNvSpPr txBox="1"/>
           <p:nvPr/>
         </p:nvSpPr>
         <p:spPr>
           <a:xfrm>
-            <a:off x="130683" y="854146"/>
-            <a:ext cx="7857423" cy="5881302"/>
+            <a:off x="1784431" y="280203"/>
+            <a:ext cx="4201610" cy="400110"/>
           </a:xfrm>
           <a:prstGeom prst="rect">
             <a:avLst/>
           </a:prstGeom>
-          <a:ln w="19050"/>
-        </p:spPr>
-        <p:style>
-          <a:lnRef idx="2">
-            <a:schemeClr val="accent1"/>
-          </a:lnRef>
-          <a:fillRef idx="1">
-            <a:schemeClr val="lt1"/>
-          </a:fillRef>
-          <a:effectRef idx="0">
-            <a:schemeClr val="accent1"/>
-          </a:effectRef>
-          <a:fontRef idx="minor">
-            <a:schemeClr val="dk1"/>
-          </a:fontRef>
-        </p:style>
-        <p:txBody>
-          <a:bodyPr rtlCol="0" anchor="ctr"/>
-          <a:lstStyle/>
-          <a:p>
-            <a:endParaRPr lang="en-SG"/>
-          </a:p>
-        </p:txBody>
-      </p:sp>
-      <p:sp>
-        <p:nvSpPr>
-          <p:cNvPr id="54" name="TextBox 53"/>
-          <p:cNvSpPr txBox="1"/>
+          <a:noFill/>
+        </p:spPr>
+        <p:txBody>
+          <a:bodyPr wrap="square" rtlCol="0">
+            <a:spAutoFit/>
+          </a:bodyPr>
+          <a:lstStyle/>
+          <a:p>
+            <a:r>
+              <a:rPr lang="en-US" altLang="zh-CN" sz="2000" b="1" dirty="0">
+                <a:solidFill>
+                  <a:schemeClr val="bg1">
+                    <a:lumMod val="95000"/>
+                  </a:schemeClr>
+                </a:solidFill>
+                <a:latin typeface="微软雅黑" panose="020B0503020204020204" pitchFamily="34" charset="-122"/>
+                <a:ea typeface="微软雅黑" panose="020B0503020204020204" pitchFamily="34" charset="-122"/>
+              </a:rPr>
+              <a:t>2.1OI hardware architecture</a:t>
+            </a:r>
+          </a:p>
+        </p:txBody>
+      </p:sp>
+      <p:sp>
+        <p:nvSpPr>
+          <p:cNvPr id="10" name="矩形 9"/>
+          <p:cNvSpPr/>
           <p:nvPr/>
         </p:nvSpPr>
         <p:spPr>
           <a:xfrm>
-            <a:off x="3565762" y="1240290"/>
-            <a:ext cx="4236681" cy="4124206"/>
+            <a:off x="1663836" y="42547"/>
+            <a:ext cx="6946764" cy="658368"/>
           </a:xfrm>
           <a:prstGeom prst="rect">
             <a:avLst/>
           </a:prstGeom>
           <a:solidFill>
             <a:schemeClr val="accent1">
-              <a:lumMod val="20000"/>
-              <a:lumOff val="80000"/>
+              <a:lumMod val="40000"/>
+              <a:lumOff val="60000"/>
             </a:schemeClr>
           </a:solidFill>
           <a:ln>
             <a:solidFill>
-              <a:srgbClr val="002060"/>
+              <a:schemeClr val="accent1">
+                <a:lumMod val="40000"/>
+                <a:lumOff val="60000"/>
+              </a:schemeClr>
             </a:solidFill>
           </a:ln>
-        </p:spPr>
-        <p:txBody>
-          <a:bodyPr wrap="square" rtlCol="0">
-            <a:spAutoFit/>
-          </a:bodyPr>
-          <a:lstStyle/>
-          <a:p>
-            <a:r>
-              <a:rPr lang="en-US" sz="1200" b="1" dirty="0" smtClean="0"/>
-              <a:t>Client  Application</a:t>
-            </a:r>
-            <a:endParaRPr lang="en-US" sz="1200" b="1" dirty="0"/>
-          </a:p>
-          <a:p>
-            <a:endParaRPr lang="en-US" sz="1000" dirty="0" smtClean="0"/>
-          </a:p>
-          <a:p>
-            <a:endParaRPr lang="en-US" sz="1000" dirty="0"/>
-          </a:p>
-          <a:p>
-            <a:endParaRPr lang="en-US" sz="1000" dirty="0" smtClean="0"/>
-          </a:p>
-          <a:p>
-            <a:endParaRPr lang="en-US" sz="1000" dirty="0"/>
-          </a:p>
-          <a:p>
-            <a:endParaRPr lang="en-US" sz="1000" dirty="0" smtClean="0"/>
-          </a:p>
-          <a:p>
-            <a:endParaRPr lang="en-US" sz="1000" dirty="0"/>
-          </a:p>
-          <a:p>
-            <a:endParaRPr lang="en-US" sz="1000" dirty="0" smtClean="0"/>
-          </a:p>
-          <a:p>
-            <a:endParaRPr lang="en-US" sz="1000" dirty="0"/>
-          </a:p>
-          <a:p>
-            <a:endParaRPr lang="en-US" sz="1000" dirty="0" smtClean="0"/>
-          </a:p>
-          <a:p>
-            <a:endParaRPr lang="en-US" sz="1000" dirty="0"/>
-          </a:p>
-          <a:p>
-            <a:endParaRPr lang="en-US" sz="1000" dirty="0" smtClean="0"/>
-          </a:p>
-          <a:p>
-            <a:endParaRPr lang="en-US" sz="1000" dirty="0" smtClean="0"/>
-          </a:p>
-          <a:p>
-            <a:endParaRPr lang="en-US" sz="1000" dirty="0"/>
-          </a:p>
-          <a:p>
-            <a:endParaRPr lang="en-US" sz="1000" dirty="0" smtClean="0"/>
-          </a:p>
-          <a:p>
-            <a:endParaRPr lang="en-US" sz="1000" dirty="0"/>
-          </a:p>
-          <a:p>
-            <a:endParaRPr lang="en-US" sz="1000" dirty="0" smtClean="0"/>
-          </a:p>
-          <a:p>
-            <a:endParaRPr lang="en-US" sz="1000" dirty="0"/>
-          </a:p>
-          <a:p>
-            <a:endParaRPr lang="en-US" sz="1000" dirty="0" smtClean="0"/>
-          </a:p>
-          <a:p>
-            <a:endParaRPr lang="en-US" sz="1000" dirty="0"/>
-          </a:p>
-          <a:p>
-            <a:endParaRPr lang="en-US" sz="1000" dirty="0" smtClean="0"/>
-          </a:p>
-          <a:p>
-            <a:endParaRPr lang="en-US" sz="1000" dirty="0"/>
-          </a:p>
-          <a:p>
-            <a:endParaRPr lang="en-US" sz="1000" dirty="0" smtClean="0"/>
-          </a:p>
-          <a:p>
-            <a:endParaRPr lang="en-US" sz="1000" dirty="0" smtClean="0"/>
-          </a:p>
-          <a:p>
-            <a:endParaRPr lang="en-US" sz="1000" dirty="0"/>
-          </a:p>
-          <a:p>
-            <a:endParaRPr lang="en-US" sz="1000" dirty="0"/>
-          </a:p>
-        </p:txBody>
-      </p:sp>
-      <p:sp>
-        <p:nvSpPr>
-          <p:cNvPr id="4" name="TextBox 3"/>
-          <p:cNvSpPr txBox="1"/>
-          <p:nvPr/>
-        </p:nvSpPr>
-        <p:spPr>
-          <a:xfrm>
-            <a:off x="1320799" y="327378"/>
-            <a:ext cx="6470651" cy="369332"/>
-          </a:xfrm>
-          <a:prstGeom prst="rect">
-            <a:avLst/>
-          </a:prstGeom>
-          <a:noFill/>
-        </p:spPr>
-        <p:txBody>
-          <a:bodyPr wrap="square" rtlCol="0">
-            <a:spAutoFit/>
-          </a:bodyPr>
-          <a:lstStyle/>
-          <a:p>
-            <a:r>
-              <a:rPr lang="en-US" dirty="0" smtClean="0"/>
-              <a:t>OPTEE trust application [client &lt;-&gt; server ] design(10/07/2019) </a:t>
-            </a:r>
-            <a:endParaRPr lang="en-SG" dirty="0"/>
-          </a:p>
-        </p:txBody>
-      </p:sp>
-      <p:cxnSp>
-        <p:nvCxnSpPr>
-          <p:cNvPr id="14" name="Straight Connector 13"/>
-          <p:cNvCxnSpPr/>
-          <p:nvPr/>
-        </p:nvCxnSpPr>
-        <p:spPr>
-          <a:xfrm>
-            <a:off x="8411326" y="386262"/>
-            <a:ext cx="0" cy="6471738"/>
-          </a:xfrm>
-          <a:prstGeom prst="line">
-            <a:avLst/>
-          </a:prstGeom>
-          <a:ln>
-            <a:prstDash val="dash"/>
-          </a:ln>
-        </p:spPr>
-        <p:style>
-          <a:lnRef idx="1">
-            <a:schemeClr val="accent1"/>
-          </a:lnRef>
-          <a:fillRef idx="0">
-            <a:schemeClr val="accent1"/>
-          </a:fillRef>
-          <a:effectRef idx="0">
-            <a:schemeClr val="accent1"/>
-          </a:effectRef>
-          <a:fontRef idx="minor">
-            <a:schemeClr val="tx1"/>
-          </a:fontRef>
-        </p:style>
-      </p:cxnSp>
-      <p:sp>
-        <p:nvSpPr>
-          <p:cNvPr id="17" name="TextBox 16"/>
-          <p:cNvSpPr txBox="1"/>
-          <p:nvPr/>
-        </p:nvSpPr>
-        <p:spPr>
-          <a:xfrm>
-            <a:off x="101822" y="635793"/>
-            <a:ext cx="1772225" cy="276999"/>
-          </a:xfrm>
-          <a:prstGeom prst="rect">
-            <a:avLst/>
-          </a:prstGeom>
-          <a:noFill/>
-        </p:spPr>
-        <p:txBody>
-          <a:bodyPr wrap="square" rtlCol="0">
-            <a:spAutoFit/>
-          </a:bodyPr>
-          <a:lstStyle/>
-          <a:p>
-            <a:r>
-              <a:rPr lang="en-US" sz="1200" b="1" dirty="0" smtClean="0"/>
-              <a:t>Raspberry PI mode 3</a:t>
-            </a:r>
-            <a:endParaRPr lang="en-SG" sz="1200" b="1" dirty="0"/>
-          </a:p>
-        </p:txBody>
-      </p:sp>
-      <p:cxnSp>
-        <p:nvCxnSpPr>
-          <p:cNvPr id="19" name="Straight Connector 18"/>
-          <p:cNvCxnSpPr/>
-          <p:nvPr/>
-        </p:nvCxnSpPr>
-        <p:spPr>
-          <a:xfrm flipH="1">
-            <a:off x="3345776" y="854146"/>
-            <a:ext cx="1" cy="5723866"/>
-          </a:xfrm>
-          <a:prstGeom prst="line">
-            <a:avLst/>
-          </a:prstGeom>
-          <a:ln w="19050">
-            <a:prstDash val="dash"/>
-          </a:ln>
-        </p:spPr>
-        <p:style>
-          <a:lnRef idx="1">
-            <a:schemeClr val="accent1"/>
-          </a:lnRef>
-          <a:fillRef idx="0">
-            <a:schemeClr val="accent1"/>
-          </a:fillRef>
-          <a:effectRef idx="0">
-            <a:schemeClr val="accent1"/>
-          </a:effectRef>
-          <a:fontRef idx="minor">
-            <a:schemeClr val="tx1"/>
-          </a:fontRef>
-        </p:style>
-      </p:cxnSp>
-      <p:sp>
-        <p:nvSpPr>
-          <p:cNvPr id="27" name="TextBox 26"/>
-          <p:cNvSpPr txBox="1"/>
-          <p:nvPr/>
-        </p:nvSpPr>
-        <p:spPr>
-          <a:xfrm>
-            <a:off x="182140" y="899990"/>
-            <a:ext cx="1772225" cy="276999"/>
-          </a:xfrm>
-          <a:prstGeom prst="rect">
-            <a:avLst/>
-          </a:prstGeom>
-          <a:noFill/>
-        </p:spPr>
-        <p:txBody>
-          <a:bodyPr wrap="square" rtlCol="0">
-            <a:spAutoFit/>
-          </a:bodyPr>
-          <a:lstStyle/>
-          <a:p>
-            <a:r>
-              <a:rPr lang="en-US" sz="1200" b="1" dirty="0" smtClean="0"/>
-              <a:t>Secure World [OPTEE]</a:t>
-            </a:r>
-            <a:endParaRPr lang="en-SG" sz="1200" b="1" dirty="0"/>
-          </a:p>
-        </p:txBody>
-      </p:sp>
-      <p:sp>
-        <p:nvSpPr>
-          <p:cNvPr id="28" name="TextBox 27"/>
-          <p:cNvSpPr txBox="1"/>
-          <p:nvPr/>
-        </p:nvSpPr>
-        <p:spPr>
-          <a:xfrm>
-            <a:off x="182140" y="1250100"/>
-            <a:ext cx="2999573" cy="3816429"/>
-          </a:xfrm>
-          <a:prstGeom prst="rect">
-            <a:avLst/>
-          </a:prstGeom>
-          <a:solidFill>
-            <a:schemeClr val="accent1">
-              <a:lumMod val="20000"/>
-              <a:lumOff val="80000"/>
-            </a:schemeClr>
-          </a:solidFill>
-          <a:ln>
-            <a:solidFill>
-              <a:srgbClr val="002060"/>
-            </a:solidFill>
-          </a:ln>
-        </p:spPr>
-        <p:txBody>
-          <a:bodyPr wrap="square" rtlCol="0">
-            <a:spAutoFit/>
-          </a:bodyPr>
-          <a:lstStyle/>
-          <a:p>
-            <a:r>
-              <a:rPr lang="en-US" sz="1200" b="1" dirty="0" smtClean="0"/>
-              <a:t>Trust Application</a:t>
-            </a:r>
-          </a:p>
-          <a:p>
-            <a:endParaRPr lang="en-US" sz="1000" b="1" dirty="0"/>
-          </a:p>
-          <a:p>
-            <a:r>
-              <a:rPr lang="en-US" sz="1000" dirty="0" smtClean="0"/>
-              <a:t>TA-UUID[7aaaf200-2450-11e4-abe2-0002a5d5c51b]</a:t>
-            </a:r>
-          </a:p>
-          <a:p>
-            <a:endParaRPr lang="en-US" sz="1000" dirty="0" smtClean="0"/>
-          </a:p>
-          <a:p>
-            <a:r>
-              <a:rPr lang="en-US" sz="1000" dirty="0" smtClean="0"/>
-              <a:t>Pre-stored Value: </a:t>
-            </a:r>
-          </a:p>
-          <a:p>
-            <a:pPr marL="171450" indent="-171450">
-              <a:buFontTx/>
-              <a:buChar char="-"/>
-            </a:pPr>
-            <a:r>
-              <a:rPr lang="en-US" sz="900" b="1" u="sng" dirty="0" smtClean="0">
-                <a:solidFill>
-                  <a:srgbClr val="C00000"/>
-                </a:solidFill>
-              </a:rPr>
-              <a:t>AES </a:t>
-            </a:r>
-            <a:r>
-              <a:rPr lang="en-US" sz="900" b="1" u="sng" dirty="0">
-                <a:solidFill>
-                  <a:srgbClr val="C00000"/>
-                </a:solidFill>
-              </a:rPr>
-              <a:t>default</a:t>
-            </a:r>
-            <a:r>
-              <a:rPr lang="en-US" sz="900" b="1" u="sng" dirty="0" smtClean="0">
-                <a:solidFill>
-                  <a:srgbClr val="C00000"/>
-                </a:solidFill>
-              </a:rPr>
-              <a:t> Key List</a:t>
-            </a:r>
-            <a:r>
-              <a:rPr lang="en-US" sz="900" dirty="0" smtClean="0"/>
-              <a:t>, AES IV</a:t>
-            </a:r>
-          </a:p>
-          <a:p>
-            <a:pPr marL="171450" indent="-171450">
-              <a:buFontTx/>
-              <a:buChar char="-"/>
-            </a:pPr>
-            <a:r>
-              <a:rPr lang="en-US" sz="900" dirty="0" smtClean="0"/>
-              <a:t>Challenge String length</a:t>
-            </a:r>
-          </a:p>
-          <a:p>
-            <a:pPr marL="171450" indent="-171450">
-              <a:buFontTx/>
-              <a:buChar char="-"/>
-            </a:pPr>
-            <a:r>
-              <a:rPr lang="en-US" sz="900" dirty="0" smtClean="0"/>
-              <a:t>SWATT calculation Iteration time [m]</a:t>
-            </a:r>
-          </a:p>
-          <a:p>
-            <a:pPr marL="171450" indent="-171450">
-              <a:buFontTx/>
-              <a:buChar char="-"/>
-            </a:pPr>
-            <a:r>
-              <a:rPr lang="en-US" sz="900" dirty="0"/>
-              <a:t>Linear congruential </a:t>
-            </a:r>
-            <a:r>
-              <a:rPr lang="en-US" sz="900" dirty="0" smtClean="0"/>
-              <a:t>random(BSD rand MAX and  seed offset )</a:t>
-            </a:r>
-          </a:p>
-          <a:p>
-            <a:pPr marL="171450" indent="-171450">
-              <a:buFontTx/>
-              <a:buChar char="-"/>
-            </a:pPr>
-            <a:r>
-              <a:rPr lang="en-US" sz="900" dirty="0" smtClean="0"/>
-              <a:t>File address block range.</a:t>
-            </a:r>
-          </a:p>
-          <a:p>
-            <a:endParaRPr lang="en-US" sz="900" dirty="0" smtClean="0"/>
-          </a:p>
-          <a:p>
-            <a:r>
-              <a:rPr lang="en-US" sz="1000" dirty="0" smtClean="0"/>
-              <a:t>Functions: </a:t>
-            </a:r>
-          </a:p>
-          <a:p>
-            <a:pPr marL="228600" indent="-228600">
-              <a:buFont typeface="+mj-lt"/>
-              <a:buAutoNum type="arabicPeriod"/>
-            </a:pPr>
-            <a:r>
-              <a:rPr lang="en-US" sz="900" dirty="0" smtClean="0"/>
-              <a:t>Accept the </a:t>
-            </a:r>
-            <a:r>
-              <a:rPr lang="en-US" sz="900" dirty="0" err="1" smtClean="0"/>
-              <a:t>trustClient</a:t>
-            </a:r>
-            <a:r>
-              <a:rPr lang="en-US" sz="900" dirty="0" smtClean="0"/>
-              <a:t>(normal word) connection. </a:t>
-            </a:r>
-          </a:p>
-          <a:p>
-            <a:pPr marL="228600" indent="-228600">
-              <a:buFont typeface="+mj-lt"/>
-              <a:buAutoNum type="arabicPeriod"/>
-            </a:pPr>
-            <a:r>
-              <a:rPr lang="en-US" sz="900" b="1" u="sng" dirty="0" smtClean="0">
-                <a:solidFill>
-                  <a:srgbClr val="C00000"/>
-                </a:solidFill>
-              </a:rPr>
-              <a:t>Load default AES-Key, decrypt </a:t>
-            </a:r>
-            <a:r>
-              <a:rPr lang="en-US" sz="900" b="1" u="sng" dirty="0" err="1" smtClean="0">
-                <a:solidFill>
-                  <a:srgbClr val="C00000"/>
-                </a:solidFill>
-              </a:rPr>
-              <a:t>msg</a:t>
-            </a:r>
-            <a:r>
-              <a:rPr lang="en-US" sz="900" b="1" u="sng" dirty="0" smtClean="0">
-                <a:solidFill>
-                  <a:srgbClr val="C00000"/>
-                </a:solidFill>
-              </a:rPr>
-              <a:t>,  get session key. =&gt; Set AES session key, decrypt </a:t>
-            </a:r>
-            <a:r>
-              <a:rPr lang="en-US" sz="900" b="1" u="sng" dirty="0" err="1" smtClean="0">
-                <a:solidFill>
-                  <a:srgbClr val="C00000"/>
-                </a:solidFill>
-              </a:rPr>
-              <a:t>msg</a:t>
-            </a:r>
-            <a:r>
-              <a:rPr lang="en-US" sz="900" b="1" u="sng" dirty="0" smtClean="0">
-                <a:solidFill>
-                  <a:srgbClr val="C00000"/>
-                </a:solidFill>
-              </a:rPr>
-              <a:t>  and get challenge str. </a:t>
-            </a:r>
-            <a:endParaRPr lang="en-US" sz="900" b="1" u="sng" dirty="0">
-              <a:solidFill>
-                <a:srgbClr val="C00000"/>
-              </a:solidFill>
-            </a:endParaRPr>
-          </a:p>
-          <a:p>
-            <a:pPr marL="228600" indent="-228600">
-              <a:buFont typeface="+mj-lt"/>
-              <a:buAutoNum type="arabicPeriod"/>
-            </a:pPr>
-            <a:r>
-              <a:rPr lang="en-US" sz="900" dirty="0" smtClean="0"/>
-              <a:t>Create first </a:t>
-            </a:r>
-            <a:r>
-              <a:rPr lang="en-US" sz="900" dirty="0" err="1" smtClean="0"/>
-              <a:t>randomSeed</a:t>
-            </a:r>
-            <a:r>
-              <a:rPr lang="en-US" sz="900" dirty="0" smtClean="0"/>
-              <a:t> and extract challenge string =&gt; random file byte’s address + state list.</a:t>
-            </a:r>
-            <a:endParaRPr lang="en-US" sz="900" dirty="0"/>
-          </a:p>
-          <a:p>
-            <a:pPr marL="228600" indent="-228600">
-              <a:buFont typeface="+mj-lt"/>
-              <a:buAutoNum type="arabicPeriod"/>
-            </a:pPr>
-            <a:r>
-              <a:rPr lang="en-US" sz="900" dirty="0" smtClean="0"/>
-              <a:t>Do SWATT calculation for input byte, refresh all the TA(</a:t>
-            </a:r>
-            <a:r>
-              <a:rPr lang="en-US" sz="900" dirty="0" err="1" smtClean="0"/>
-              <a:t>trustWorld</a:t>
-            </a:r>
-            <a:r>
-              <a:rPr lang="en-US" sz="900" dirty="0" smtClean="0"/>
-              <a:t>) inside parameters. </a:t>
-            </a:r>
-          </a:p>
-          <a:p>
-            <a:pPr marL="228600" indent="-228600">
-              <a:buFont typeface="+mj-lt"/>
-              <a:buAutoNum type="arabicPeriod"/>
-            </a:pPr>
-            <a:r>
-              <a:rPr lang="en-US" sz="900" dirty="0" smtClean="0"/>
-              <a:t>Return to step 3, repeat n times. </a:t>
-            </a:r>
-          </a:p>
-          <a:p>
-            <a:pPr marL="228600" indent="-228600">
-              <a:buFont typeface="+mj-lt"/>
-              <a:buAutoNum type="arabicPeriod"/>
-            </a:pPr>
-            <a:r>
-              <a:rPr lang="en-US" sz="900" dirty="0" smtClean="0"/>
-              <a:t>Finished all and get the final SWATT </a:t>
-            </a:r>
-            <a:r>
-              <a:rPr lang="en-US" sz="900" dirty="0" err="1" smtClean="0"/>
-              <a:t>int</a:t>
-            </a:r>
-            <a:r>
-              <a:rPr lang="en-US" sz="900" dirty="0" smtClean="0"/>
-              <a:t>/hex val.</a:t>
-            </a:r>
-          </a:p>
-          <a:p>
-            <a:pPr marL="228600" indent="-228600">
-              <a:buFont typeface="+mj-lt"/>
-              <a:buAutoNum type="arabicPeriod"/>
-            </a:pPr>
-            <a:r>
-              <a:rPr lang="en-US" sz="900" dirty="0" smtClean="0"/>
-              <a:t>Load AES-session Key, encrypt SWATT value. </a:t>
-            </a:r>
-          </a:p>
-          <a:p>
-            <a:pPr marL="228600" indent="-228600">
-              <a:buFont typeface="+mj-lt"/>
-              <a:buAutoNum type="arabicPeriod"/>
-            </a:pPr>
-            <a:r>
-              <a:rPr lang="en-US" sz="900" dirty="0"/>
-              <a:t>Load AES-session -Key, decrypt </a:t>
-            </a:r>
-            <a:r>
-              <a:rPr lang="en-US" sz="900" dirty="0" err="1"/>
-              <a:t>msg</a:t>
-            </a:r>
-            <a:r>
-              <a:rPr lang="en-US" sz="900" dirty="0" smtClean="0"/>
-              <a:t>, get server verify result. </a:t>
-            </a:r>
-            <a:endParaRPr lang="en-US" sz="900" dirty="0"/>
-          </a:p>
-        </p:txBody>
-      </p:sp>
-      <p:sp>
-        <p:nvSpPr>
-          <p:cNvPr id="30" name="TextBox 29"/>
-          <p:cNvSpPr txBox="1"/>
-          <p:nvPr/>
-        </p:nvSpPr>
-        <p:spPr>
-          <a:xfrm>
-            <a:off x="9046130" y="3746468"/>
-            <a:ext cx="1276497" cy="369332"/>
-          </a:xfrm>
-          <a:prstGeom prst="rect">
-            <a:avLst/>
-          </a:prstGeom>
-          <a:solidFill>
-            <a:schemeClr val="accent1">
-              <a:lumMod val="20000"/>
-              <a:lumOff val="80000"/>
-            </a:schemeClr>
-          </a:solidFill>
-          <a:ln>
-            <a:solidFill>
-              <a:srgbClr val="002060"/>
-            </a:solidFill>
-          </a:ln>
-        </p:spPr>
-        <p:txBody>
-          <a:bodyPr wrap="square" rtlCol="0">
-            <a:spAutoFit/>
-          </a:bodyPr>
-          <a:lstStyle/>
-          <a:p>
-            <a:r>
-              <a:rPr lang="en-US" dirty="0" smtClean="0"/>
-              <a:t>TEE driver </a:t>
-            </a:r>
-          </a:p>
-        </p:txBody>
-      </p:sp>
-      <p:pic>
-        <p:nvPicPr>
-          <p:cNvPr id="31" name="Picture 30"/>
-          <p:cNvPicPr>
-            <a:picLocks noChangeAspect="1"/>
-          </p:cNvPicPr>
-          <p:nvPr/>
-        </p:nvPicPr>
-        <p:blipFill>
-          <a:blip r:embed="rId3"/>
-          <a:stretch>
-            <a:fillRect/>
-          </a:stretch>
-        </p:blipFill>
-        <p:spPr>
-          <a:xfrm>
-            <a:off x="730583" y="5737196"/>
-            <a:ext cx="1449443" cy="782490"/>
-          </a:xfrm>
-          <a:prstGeom prst="rect">
-            <a:avLst/>
-          </a:prstGeom>
-          <a:ln w="12700">
-            <a:solidFill>
-              <a:schemeClr val="tx1"/>
-            </a:solidFill>
-          </a:ln>
-        </p:spPr>
-      </p:pic>
-      <p:sp>
-        <p:nvSpPr>
-          <p:cNvPr id="35" name="TextBox 34"/>
-          <p:cNvSpPr txBox="1"/>
-          <p:nvPr/>
-        </p:nvSpPr>
-        <p:spPr>
-          <a:xfrm>
-            <a:off x="3597320" y="5582186"/>
-            <a:ext cx="244548" cy="253916"/>
-          </a:xfrm>
-          <a:prstGeom prst="rect">
-            <a:avLst/>
-          </a:prstGeom>
-          <a:noFill/>
-        </p:spPr>
-        <p:txBody>
-          <a:bodyPr wrap="square" rtlCol="0">
-            <a:spAutoFit/>
-          </a:bodyPr>
-          <a:lstStyle/>
-          <a:p>
-            <a:r>
-              <a:rPr lang="en-US" sz="1050" u="sng" dirty="0" smtClean="0"/>
-              <a:t>1</a:t>
-            </a:r>
-            <a:endParaRPr lang="en-SG" sz="1050" u="sng" dirty="0"/>
-          </a:p>
-        </p:txBody>
-      </p:sp>
-      <p:sp>
-        <p:nvSpPr>
-          <p:cNvPr id="39" name="TextBox 38"/>
-          <p:cNvSpPr txBox="1"/>
-          <p:nvPr/>
-        </p:nvSpPr>
-        <p:spPr>
-          <a:xfrm>
-            <a:off x="2338925" y="5988199"/>
-            <a:ext cx="1689221" cy="261610"/>
-          </a:xfrm>
-          <a:prstGeom prst="rect">
-            <a:avLst/>
-          </a:prstGeom>
-          <a:noFill/>
-        </p:spPr>
-        <p:txBody>
-          <a:bodyPr wrap="square" rtlCol="0">
-            <a:spAutoFit/>
-          </a:bodyPr>
-          <a:lstStyle/>
-          <a:p>
-            <a:r>
-              <a:rPr lang="en-US" sz="1100" u="sng" dirty="0" smtClean="0"/>
-              <a:t>1, 2, 3, 4, 5, 7  </a:t>
-            </a:r>
-            <a:endParaRPr lang="en-SG" sz="1100" u="sng" dirty="0"/>
-          </a:p>
-        </p:txBody>
-      </p:sp>
-      <p:sp>
-        <p:nvSpPr>
-          <p:cNvPr id="45" name="TextBox 44"/>
-          <p:cNvSpPr txBox="1"/>
-          <p:nvPr/>
-        </p:nvSpPr>
-        <p:spPr>
-          <a:xfrm>
-            <a:off x="2109071" y="3762963"/>
-            <a:ext cx="244548" cy="369332"/>
-          </a:xfrm>
-          <a:prstGeom prst="rect">
-            <a:avLst/>
-          </a:prstGeom>
-          <a:noFill/>
-        </p:spPr>
-        <p:txBody>
-          <a:bodyPr wrap="square" rtlCol="0">
-            <a:spAutoFit/>
-          </a:bodyPr>
-          <a:lstStyle/>
-          <a:p>
-            <a:endParaRPr lang="en-SG" dirty="0"/>
-          </a:p>
-        </p:txBody>
-      </p:sp>
-      <p:sp>
-        <p:nvSpPr>
-          <p:cNvPr id="53" name="TextBox 52"/>
-          <p:cNvSpPr txBox="1"/>
-          <p:nvPr/>
-        </p:nvSpPr>
-        <p:spPr>
-          <a:xfrm>
-            <a:off x="3324875" y="874815"/>
-            <a:ext cx="1987456" cy="276999"/>
-          </a:xfrm>
-          <a:prstGeom prst="rect">
-            <a:avLst/>
-          </a:prstGeom>
-          <a:noFill/>
-        </p:spPr>
-        <p:txBody>
-          <a:bodyPr wrap="square" rtlCol="0">
-            <a:spAutoFit/>
-          </a:bodyPr>
-          <a:lstStyle/>
-          <a:p>
-            <a:r>
-              <a:rPr lang="en-US" sz="1200" b="1" dirty="0" smtClean="0"/>
-              <a:t>Normal World [</a:t>
-            </a:r>
-            <a:r>
-              <a:rPr lang="en-US" sz="1200" b="1" dirty="0" err="1" smtClean="0"/>
-              <a:t>Raspbian</a:t>
-            </a:r>
-            <a:r>
-              <a:rPr lang="en-US" sz="1200" b="1" dirty="0" smtClean="0"/>
-              <a:t>]</a:t>
-            </a:r>
-            <a:endParaRPr lang="en-SG" sz="1200" b="1" dirty="0"/>
-          </a:p>
-        </p:txBody>
-      </p:sp>
-      <p:sp>
-        <p:nvSpPr>
-          <p:cNvPr id="55" name="TextBox 54"/>
-          <p:cNvSpPr txBox="1"/>
-          <p:nvPr/>
-        </p:nvSpPr>
-        <p:spPr>
-          <a:xfrm>
-            <a:off x="3537235" y="6164586"/>
-            <a:ext cx="4254215" cy="276999"/>
-          </a:xfrm>
-          <a:prstGeom prst="rect">
-            <a:avLst/>
-          </a:prstGeom>
-          <a:solidFill>
-            <a:schemeClr val="accent1">
-              <a:lumMod val="20000"/>
-              <a:lumOff val="80000"/>
-            </a:schemeClr>
-          </a:solidFill>
-          <a:ln>
-            <a:solidFill>
-              <a:srgbClr val="002060"/>
-            </a:solidFill>
-          </a:ln>
-        </p:spPr>
-        <p:txBody>
-          <a:bodyPr wrap="square" rtlCol="0">
-            <a:spAutoFit/>
-          </a:bodyPr>
-          <a:lstStyle/>
-          <a:p>
-            <a:r>
-              <a:rPr lang="en-US" sz="1200" b="1" dirty="0" smtClean="0"/>
-              <a:t>OPTEE driver  &lt;=&gt;  Tee-supplicant service </a:t>
-            </a:r>
-          </a:p>
-        </p:txBody>
-      </p:sp>
-      <p:sp>
-        <p:nvSpPr>
-          <p:cNvPr id="58" name="Rectangle 57"/>
-          <p:cNvSpPr/>
-          <p:nvPr/>
-        </p:nvSpPr>
-        <p:spPr>
-          <a:xfrm>
-            <a:off x="3813303" y="1601352"/>
-            <a:ext cx="1165595" cy="244238"/>
-          </a:xfrm>
-          <a:prstGeom prst="rect">
-            <a:avLst/>
-          </a:prstGeom>
         </p:spPr>
         <p:style>
           <a:lnRef idx="2">
@@ -5370,248 +4777,45 @@
           <a:bodyPr rtlCol="0" anchor="ctr"/>
           <a:lstStyle/>
           <a:p>
-            <a:r>
-              <a:rPr lang="en-US" sz="800" b="1" dirty="0" smtClean="0"/>
-              <a:t>1 - Start OPTEE session </a:t>
-            </a:r>
-            <a:endParaRPr lang="en-SG" sz="800" b="1" dirty="0"/>
-          </a:p>
-        </p:txBody>
-      </p:sp>
-      <p:sp>
-        <p:nvSpPr>
-          <p:cNvPr id="67" name="TextBox 66"/>
-          <p:cNvSpPr txBox="1"/>
+            <a:pPr algn="ctr">
+              <a:defRPr/>
+            </a:pPr>
+            <a:endParaRPr lang="zh-CN" altLang="en-US">
+              <a:solidFill>
+                <a:prstClr val="white"/>
+              </a:solidFill>
+              <a:latin typeface="Calibri" panose="020F0502020204030204"/>
+              <a:ea typeface="宋体" panose="02010600030101010101" pitchFamily="2" charset="-122"/>
+            </a:endParaRPr>
+          </a:p>
+        </p:txBody>
+      </p:sp>
+      <p:sp>
+        <p:nvSpPr>
+          <p:cNvPr id="11" name="矩形 10"/>
+          <p:cNvSpPr/>
           <p:nvPr/>
         </p:nvSpPr>
         <p:spPr>
           <a:xfrm>
-            <a:off x="9004187" y="995085"/>
-            <a:ext cx="3149817" cy="4370427"/>
+            <a:off x="1521324" y="42547"/>
+            <a:ext cx="4117476" cy="658368"/>
           </a:xfrm>
           <a:prstGeom prst="rect">
             <a:avLst/>
           </a:prstGeom>
           <a:solidFill>
             <a:schemeClr val="accent1">
-              <a:lumMod val="20000"/>
-              <a:lumOff val="80000"/>
+              <a:lumMod val="50000"/>
             </a:schemeClr>
           </a:solidFill>
           <a:ln>
             <a:solidFill>
-              <a:srgbClr val="002060"/>
+              <a:schemeClr val="accent1">
+                <a:lumMod val="50000"/>
+              </a:schemeClr>
             </a:solidFill>
           </a:ln>
-        </p:spPr>
-        <p:txBody>
-          <a:bodyPr wrap="square" rtlCol="0">
-            <a:spAutoFit/>
-          </a:bodyPr>
-          <a:lstStyle/>
-          <a:p>
-            <a:r>
-              <a:rPr lang="en-US" sz="1200" b="1" dirty="0" smtClean="0"/>
-              <a:t>Trust Server thread</a:t>
-            </a:r>
-            <a:r>
-              <a:rPr lang="en-US" b="1" dirty="0" smtClean="0"/>
-              <a:t> </a:t>
-            </a:r>
-          </a:p>
-          <a:p>
-            <a:endParaRPr lang="en-US" sz="1000" dirty="0" smtClean="0"/>
-          </a:p>
-          <a:p>
-            <a:endParaRPr lang="en-US" sz="1000" dirty="0"/>
-          </a:p>
-          <a:p>
-            <a:endParaRPr lang="en-US" sz="1000" dirty="0" smtClean="0"/>
-          </a:p>
-          <a:p>
-            <a:endParaRPr lang="en-US" sz="1000" dirty="0"/>
-          </a:p>
-          <a:p>
-            <a:endParaRPr lang="en-US" sz="1000" dirty="0" smtClean="0"/>
-          </a:p>
-          <a:p>
-            <a:endParaRPr lang="en-US" sz="1000" dirty="0"/>
-          </a:p>
-          <a:p>
-            <a:endParaRPr lang="en-US" sz="1000" dirty="0" smtClean="0"/>
-          </a:p>
-          <a:p>
-            <a:endParaRPr lang="en-US" sz="1000" dirty="0"/>
-          </a:p>
-          <a:p>
-            <a:endParaRPr lang="en-US" sz="1000" dirty="0" smtClean="0"/>
-          </a:p>
-          <a:p>
-            <a:endParaRPr lang="en-US" sz="1000" dirty="0"/>
-          </a:p>
-          <a:p>
-            <a:endParaRPr lang="en-US" sz="1000" dirty="0" smtClean="0"/>
-          </a:p>
-          <a:p>
-            <a:endParaRPr lang="en-US" sz="1000" dirty="0"/>
-          </a:p>
-          <a:p>
-            <a:endParaRPr lang="en-US" sz="1000" dirty="0" smtClean="0"/>
-          </a:p>
-          <a:p>
-            <a:endParaRPr lang="en-US" sz="1000" dirty="0"/>
-          </a:p>
-          <a:p>
-            <a:endParaRPr lang="en-US" sz="1000" dirty="0" smtClean="0"/>
-          </a:p>
-          <a:p>
-            <a:endParaRPr lang="en-US" sz="1000" dirty="0"/>
-          </a:p>
-          <a:p>
-            <a:endParaRPr lang="en-US" sz="1000" dirty="0" smtClean="0"/>
-          </a:p>
-          <a:p>
-            <a:endParaRPr lang="en-US" sz="1000" dirty="0"/>
-          </a:p>
-          <a:p>
-            <a:endParaRPr lang="en-US" sz="1000" dirty="0" smtClean="0"/>
-          </a:p>
-          <a:p>
-            <a:endParaRPr lang="en-US" sz="1000" dirty="0"/>
-          </a:p>
-          <a:p>
-            <a:endParaRPr lang="en-US" sz="1000" dirty="0" smtClean="0"/>
-          </a:p>
-          <a:p>
-            <a:endParaRPr lang="en-US" sz="1000" dirty="0"/>
-          </a:p>
-          <a:p>
-            <a:endParaRPr lang="en-US" sz="1000" dirty="0" smtClean="0"/>
-          </a:p>
-          <a:p>
-            <a:endParaRPr lang="en-US" sz="1000" dirty="0"/>
-          </a:p>
-          <a:p>
-            <a:endParaRPr lang="en-US" sz="1000" dirty="0" smtClean="0"/>
-          </a:p>
-          <a:p>
-            <a:endParaRPr lang="en-US" sz="1000" dirty="0"/>
-          </a:p>
-        </p:txBody>
-      </p:sp>
-      <p:cxnSp>
-        <p:nvCxnSpPr>
-          <p:cNvPr id="69" name="Straight Arrow Connector 68"/>
-          <p:cNvCxnSpPr/>
-          <p:nvPr/>
-        </p:nvCxnSpPr>
-        <p:spPr>
-          <a:xfrm flipV="1">
-            <a:off x="6253113" y="3411541"/>
-            <a:ext cx="2877903" cy="0"/>
-          </a:xfrm>
-          <a:prstGeom prst="straightConnector1">
-            <a:avLst/>
-          </a:prstGeom>
-          <a:ln>
-            <a:tailEnd type="triangle"/>
-          </a:ln>
-        </p:spPr>
-        <p:style>
-          <a:lnRef idx="1">
-            <a:schemeClr val="accent1"/>
-          </a:lnRef>
-          <a:fillRef idx="0">
-            <a:schemeClr val="accent1"/>
-          </a:fillRef>
-          <a:effectRef idx="0">
-            <a:schemeClr val="accent1"/>
-          </a:effectRef>
-          <a:fontRef idx="minor">
-            <a:schemeClr val="tx1"/>
-          </a:fontRef>
-        </p:style>
-      </p:cxnSp>
-      <p:cxnSp>
-        <p:nvCxnSpPr>
-          <p:cNvPr id="79" name="Straight Arrow Connector 78"/>
-          <p:cNvCxnSpPr/>
-          <p:nvPr/>
-        </p:nvCxnSpPr>
-        <p:spPr>
-          <a:xfrm>
-            <a:off x="7609448" y="2314594"/>
-            <a:ext cx="0" cy="3837599"/>
-          </a:xfrm>
-          <a:prstGeom prst="straightConnector1">
-            <a:avLst/>
-          </a:prstGeom>
-          <a:ln>
-            <a:tailEnd type="triangle"/>
-          </a:ln>
-        </p:spPr>
-        <p:style>
-          <a:lnRef idx="1">
-            <a:schemeClr val="dk1"/>
-          </a:lnRef>
-          <a:fillRef idx="0">
-            <a:schemeClr val="dk1"/>
-          </a:fillRef>
-          <a:effectRef idx="0">
-            <a:schemeClr val="dk1"/>
-          </a:effectRef>
-          <a:fontRef idx="minor">
-            <a:schemeClr val="tx1"/>
-          </a:fontRef>
-        </p:style>
-      </p:cxnSp>
-      <p:cxnSp>
-        <p:nvCxnSpPr>
-          <p:cNvPr id="81" name="Straight Arrow Connector 80"/>
-          <p:cNvCxnSpPr/>
-          <p:nvPr/>
-        </p:nvCxnSpPr>
-        <p:spPr>
-          <a:xfrm flipV="1">
-            <a:off x="5006913" y="1714908"/>
-            <a:ext cx="330843" cy="303"/>
-          </a:xfrm>
-          <a:prstGeom prst="straightConnector1">
-            <a:avLst/>
-          </a:prstGeom>
-          <a:ln>
-            <a:tailEnd type="triangle"/>
-          </a:ln>
-        </p:spPr>
-        <p:style>
-          <a:lnRef idx="1">
-            <a:schemeClr val="accent1"/>
-          </a:lnRef>
-          <a:fillRef idx="0">
-            <a:schemeClr val="accent1"/>
-          </a:fillRef>
-          <a:effectRef idx="0">
-            <a:schemeClr val="accent1"/>
-          </a:effectRef>
-          <a:fontRef idx="minor">
-            <a:schemeClr val="tx1"/>
-          </a:fontRef>
-        </p:style>
-      </p:cxnSp>
-      <p:sp>
-        <p:nvSpPr>
-          <p:cNvPr id="88" name="Rectangle 87"/>
-          <p:cNvSpPr/>
-          <p:nvPr/>
-        </p:nvSpPr>
-        <p:spPr>
-          <a:xfrm>
-            <a:off x="5372377" y="1137625"/>
-            <a:ext cx="1793635" cy="249531"/>
-          </a:xfrm>
-          <a:prstGeom prst="rect">
-            <a:avLst/>
-          </a:prstGeom>
         </p:spPr>
         <p:style>
           <a:lnRef idx="2">
@@ -5633,50 +4837,124 @@
           <a:bodyPr rtlCol="0" anchor="ctr"/>
           <a:lstStyle/>
           <a:p>
-            <a:r>
-              <a:rPr lang="en-US" sz="800" b="1" dirty="0" smtClean="0"/>
-              <a:t>0 . </a:t>
-            </a:r>
-            <a:r>
-              <a:rPr lang="en-US" sz="800" b="1" dirty="0" err="1" smtClean="0"/>
-              <a:t>Init</a:t>
-            </a:r>
-            <a:r>
-              <a:rPr lang="en-US" sz="800" b="1" dirty="0" smtClean="0"/>
-              <a:t> TCP client  and load </a:t>
-            </a:r>
-            <a:r>
-              <a:rPr lang="en-US" sz="800" b="1" dirty="0" err="1"/>
-              <a:t>c</a:t>
-            </a:r>
-            <a:r>
-              <a:rPr lang="en-US" sz="800" b="1" dirty="0" err="1" smtClean="0"/>
-              <a:t>onfig</a:t>
-            </a:r>
-            <a:r>
-              <a:rPr lang="en-US" sz="800" b="1" dirty="0" smtClean="0"/>
-              <a:t> file</a:t>
-            </a:r>
-            <a:endParaRPr lang="en-SG" sz="800" b="1" dirty="0"/>
+            <a:pPr algn="ctr">
+              <a:defRPr/>
+            </a:pPr>
+            <a:endParaRPr lang="zh-CN" altLang="en-US">
+              <a:solidFill>
+                <a:prstClr val="white"/>
+              </a:solidFill>
+              <a:latin typeface="Calibri" panose="020F0502020204030204"/>
+              <a:ea typeface="宋体" panose="02010600030101010101" pitchFamily="2" charset="-122"/>
+            </a:endParaRPr>
+          </a:p>
+        </p:txBody>
+      </p:sp>
+      <p:sp>
+        <p:nvSpPr>
+          <p:cNvPr id="12" name="文本框 11"/>
+          <p:cNvSpPr txBox="1"/>
+          <p:nvPr/>
+        </p:nvSpPr>
+        <p:spPr>
+          <a:xfrm>
+            <a:off x="1663837" y="171676"/>
+            <a:ext cx="4017065" cy="400110"/>
+          </a:xfrm>
+          <a:prstGeom prst="rect">
+            <a:avLst/>
+          </a:prstGeom>
+          <a:noFill/>
+        </p:spPr>
+        <p:txBody>
+          <a:bodyPr wrap="square" rtlCol="0">
+            <a:spAutoFit/>
+          </a:bodyPr>
+          <a:lstStyle/>
+          <a:p>
+            <a:pPr lvl="0">
+              <a:defRPr/>
+            </a:pPr>
+            <a:r>
+              <a:rPr lang="en-US" altLang="zh-CN" sz="2000" b="1" dirty="0">
+                <a:solidFill>
+                  <a:prstClr val="white">
+                    <a:lumMod val="95000"/>
+                  </a:prstClr>
+                </a:solidFill>
+                <a:latin typeface="微软雅黑" panose="020B0503020204020204" pitchFamily="34" charset="-122"/>
+                <a:ea typeface="微软雅黑" panose="020B0503020204020204" pitchFamily="34" charset="-122"/>
+              </a:rPr>
+              <a:t>IOT Project Progress Report</a:t>
+            </a:r>
+          </a:p>
+        </p:txBody>
+      </p:sp>
+      <p:sp>
+        <p:nvSpPr>
+          <p:cNvPr id="13" name="文本框 12"/>
+          <p:cNvSpPr txBox="1"/>
+          <p:nvPr/>
+        </p:nvSpPr>
+        <p:spPr>
+          <a:xfrm>
+            <a:off x="5885377" y="171676"/>
+            <a:ext cx="2098267" cy="400110"/>
+          </a:xfrm>
+          <a:prstGeom prst="rect">
+            <a:avLst/>
+          </a:prstGeom>
+          <a:noFill/>
+        </p:spPr>
+        <p:txBody>
+          <a:bodyPr wrap="none" rtlCol="0">
+            <a:spAutoFit/>
+          </a:bodyPr>
+          <a:lstStyle/>
+          <a:p>
+            <a:pPr>
+              <a:defRPr/>
+            </a:pPr>
+            <a:r>
+              <a:rPr lang="en-US" altLang="zh-CN" sz="2000" b="1" dirty="0">
+                <a:solidFill>
+                  <a:srgbClr val="5B9BD5">
+                    <a:lumMod val="75000"/>
+                  </a:srgbClr>
+                </a:solidFill>
+                <a:latin typeface="微软雅黑" panose="020B0503020204020204" pitchFamily="34" charset="-122"/>
+                <a:ea typeface="微软雅黑" panose="020B0503020204020204" pitchFamily="34" charset="-122"/>
+              </a:rPr>
+              <a:t>Liu YuanCheng</a:t>
+            </a:r>
+            <a:endParaRPr lang="zh-CN" altLang="en-US" sz="2000" b="1" dirty="0">
+              <a:solidFill>
+                <a:srgbClr val="5B9BD5">
+                  <a:lumMod val="75000"/>
+                </a:srgbClr>
+              </a:solidFill>
+              <a:latin typeface="微软雅黑" panose="020B0503020204020204" pitchFamily="34" charset="-122"/>
+              <a:ea typeface="微软雅黑" panose="020B0503020204020204" pitchFamily="34" charset="-122"/>
+            </a:endParaRPr>
           </a:p>
         </p:txBody>
       </p:sp>
       <p:cxnSp>
         <p:nvCxnSpPr>
-          <p:cNvPr id="90" name="Straight Arrow Connector 89"/>
+          <p:cNvPr id="6" name="Straight Connector 5"/>
           <p:cNvCxnSpPr/>
           <p:nvPr/>
         </p:nvCxnSpPr>
         <p:spPr>
           <a:xfrm flipV="1">
-            <a:off x="6745929" y="1666372"/>
-            <a:ext cx="2975442" cy="28576"/>
-          </a:xfrm>
-          <a:prstGeom prst="straightConnector1">
+            <a:off x="3733801" y="884034"/>
+            <a:ext cx="8458199" cy="42398"/>
+          </a:xfrm>
+          <a:prstGeom prst="line">
             <a:avLst/>
           </a:prstGeom>
-          <a:ln>
-            <a:tailEnd type="triangle"/>
+          <a:ln w="12700">
+            <a:prstDash val="solid"/>
           </a:ln>
         </p:spPr>
         <p:style>
@@ -5694,286 +4972,46 @@
           </a:fontRef>
         </p:style>
       </p:cxnSp>
-      <p:sp>
-        <p:nvSpPr>
-          <p:cNvPr id="42" name="Rectangle 41"/>
-          <p:cNvSpPr/>
+      <p:pic>
+        <p:nvPicPr>
+          <p:cNvPr id="7" name="Picture 6"/>
+          <p:cNvPicPr>
+            <a:picLocks noChangeAspect="1"/>
+          </p:cNvPicPr>
           <p:nvPr/>
-        </p:nvSpPr>
-        <p:spPr>
-          <a:xfrm>
-            <a:off x="10456812" y="1870772"/>
-            <a:ext cx="1649156" cy="405544"/>
+        </p:nvPicPr>
+        <p:blipFill>
+          <a:blip r:embed="rId3" cstate="print">
+            <a:extLst>
+              <a:ext uri="{28A0092B-C50C-407E-A947-70E740481C1C}">
+                <a14:useLocalDpi xmlns:a14="http://schemas.microsoft.com/office/drawing/2010/main" val="0"/>
+              </a:ext>
+            </a:extLst>
+          </a:blip>
+          <a:stretch>
+            <a:fillRect/>
+          </a:stretch>
+        </p:blipFill>
+        <p:spPr>
+          <a:xfrm>
+            <a:off x="11319998" y="7919"/>
+            <a:ext cx="872002" cy="872002"/>
           </a:xfrm>
           <a:prstGeom prst="rect">
             <a:avLst/>
           </a:prstGeom>
         </p:spPr>
-        <p:style>
-          <a:lnRef idx="2">
-            <a:schemeClr val="accent1">
-              <a:shade val="50000"/>
-            </a:schemeClr>
-          </a:lnRef>
-          <a:fillRef idx="1">
-            <a:schemeClr val="accent1"/>
-          </a:fillRef>
-          <a:effectRef idx="0">
-            <a:schemeClr val="accent1"/>
-          </a:effectRef>
-          <a:fontRef idx="minor">
-            <a:schemeClr val="lt1"/>
-          </a:fontRef>
-        </p:style>
-        <p:txBody>
-          <a:bodyPr rtlCol="0" anchor="ctr"/>
-          <a:lstStyle/>
-          <a:p>
-            <a:r>
-              <a:rPr lang="en-US" sz="800" b="1" u="sng" dirty="0" smtClean="0">
-                <a:solidFill>
-                  <a:srgbClr val="C00000"/>
-                </a:solidFill>
-              </a:rPr>
-              <a:t>2.2 - Load AES256 key + IV </a:t>
-            </a:r>
-          </a:p>
-          <a:p>
-            <a:r>
-              <a:rPr lang="en-US" sz="800" b="1" u="sng" dirty="0" smtClean="0">
-                <a:solidFill>
-                  <a:srgbClr val="C00000"/>
-                </a:solidFill>
-              </a:rPr>
-              <a:t>=&gt; Create random 32B session key </a:t>
-            </a:r>
-            <a:br>
-              <a:rPr lang="en-US" sz="800" b="1" u="sng" dirty="0" smtClean="0">
-                <a:solidFill>
-                  <a:srgbClr val="C00000"/>
-                </a:solidFill>
-              </a:rPr>
-            </a:br>
-            <a:r>
-              <a:rPr lang="en-US" sz="800" b="1" u="sng" dirty="0" smtClean="0">
-                <a:solidFill>
-                  <a:srgbClr val="C00000"/>
-                </a:solidFill>
-              </a:rPr>
-              <a:t>=&gt;  </a:t>
-            </a:r>
-            <a:r>
-              <a:rPr lang="en-US" sz="800" b="1" u="sng" dirty="0">
-                <a:solidFill>
-                  <a:srgbClr val="C00000"/>
-                </a:solidFill>
-              </a:rPr>
-              <a:t>Encrypt </a:t>
-            </a:r>
-            <a:r>
-              <a:rPr lang="en-US" sz="800" b="1" u="sng" dirty="0" smtClean="0">
-                <a:solidFill>
-                  <a:srgbClr val="C00000"/>
-                </a:solidFill>
-              </a:rPr>
-              <a:t>session key  </a:t>
-            </a:r>
-            <a:endParaRPr lang="en-SG" sz="800" b="1" u="sng" dirty="0">
-              <a:solidFill>
-                <a:srgbClr val="C00000"/>
-              </a:solidFill>
-            </a:endParaRPr>
-          </a:p>
-        </p:txBody>
-      </p:sp>
-      <p:sp>
-        <p:nvSpPr>
-          <p:cNvPr id="43" name="Rectangle 42"/>
-          <p:cNvSpPr/>
-          <p:nvPr/>
-        </p:nvSpPr>
-        <p:spPr>
-          <a:xfrm>
-            <a:off x="10387387" y="2925560"/>
-            <a:ext cx="1249413" cy="257500"/>
-          </a:xfrm>
-          <a:prstGeom prst="rect">
-            <a:avLst/>
-          </a:prstGeom>
-        </p:spPr>
-        <p:style>
-          <a:lnRef idx="2">
-            <a:schemeClr val="accent1">
-              <a:shade val="50000"/>
-            </a:schemeClr>
-          </a:lnRef>
-          <a:fillRef idx="1">
-            <a:schemeClr val="accent1"/>
-          </a:fillRef>
-          <a:effectRef idx="0">
-            <a:schemeClr val="accent1"/>
-          </a:effectRef>
-          <a:fontRef idx="minor">
-            <a:schemeClr val="lt1"/>
-          </a:fontRef>
-        </p:style>
-        <p:txBody>
-          <a:bodyPr rtlCol="0" anchor="ctr"/>
-          <a:lstStyle/>
-          <a:p>
-            <a:r>
-              <a:rPr lang="en-US" sz="800" b="1" dirty="0" smtClean="0"/>
-              <a:t>2.3 Fetch Pre-saved program </a:t>
-            </a:r>
-            <a:endParaRPr lang="en-SG" sz="800" b="1" dirty="0"/>
-          </a:p>
-        </p:txBody>
-      </p:sp>
-      <p:cxnSp>
-        <p:nvCxnSpPr>
-          <p:cNvPr id="47" name="Straight Arrow Connector 46"/>
-          <p:cNvCxnSpPr/>
-          <p:nvPr/>
-        </p:nvCxnSpPr>
-        <p:spPr>
-          <a:xfrm>
-            <a:off x="9920451" y="1723471"/>
-            <a:ext cx="1200" cy="155469"/>
-          </a:xfrm>
-          <a:prstGeom prst="straightConnector1">
-            <a:avLst/>
-          </a:prstGeom>
-          <a:ln>
-            <a:tailEnd type="triangle"/>
-          </a:ln>
-        </p:spPr>
-        <p:style>
-          <a:lnRef idx="1">
-            <a:schemeClr val="accent1"/>
-          </a:lnRef>
-          <a:fillRef idx="0">
-            <a:schemeClr val="accent1"/>
-          </a:fillRef>
-          <a:effectRef idx="0">
-            <a:schemeClr val="accent1"/>
-          </a:effectRef>
-          <a:fontRef idx="minor">
-            <a:schemeClr val="tx1"/>
-          </a:fontRef>
-        </p:style>
-      </p:cxnSp>
-      <p:cxnSp>
-        <p:nvCxnSpPr>
-          <p:cNvPr id="23" name="Straight Arrow Connector 22"/>
-          <p:cNvCxnSpPr/>
-          <p:nvPr/>
-        </p:nvCxnSpPr>
-        <p:spPr>
-          <a:xfrm>
-            <a:off x="2246811" y="6283709"/>
-            <a:ext cx="1290424" cy="0"/>
-          </a:xfrm>
-          <a:prstGeom prst="straightConnector1">
-            <a:avLst/>
-          </a:prstGeom>
-          <a:ln w="38100">
-            <a:headEnd type="triangle"/>
-            <a:tailEnd type="triangle"/>
-          </a:ln>
-        </p:spPr>
-        <p:style>
-          <a:lnRef idx="1">
-            <a:schemeClr val="accent1"/>
-          </a:lnRef>
-          <a:fillRef idx="0">
-            <a:schemeClr val="accent1"/>
-          </a:fillRef>
-          <a:effectRef idx="0">
-            <a:schemeClr val="accent1"/>
-          </a:effectRef>
-          <a:fontRef idx="minor">
-            <a:schemeClr val="tx1"/>
-          </a:fontRef>
-        </p:style>
-      </p:cxnSp>
-      <p:cxnSp>
-        <p:nvCxnSpPr>
-          <p:cNvPr id="25" name="Straight Arrow Connector 24"/>
-          <p:cNvCxnSpPr/>
-          <p:nvPr/>
-        </p:nvCxnSpPr>
-        <p:spPr>
-          <a:xfrm flipH="1">
-            <a:off x="3808654" y="1845590"/>
-            <a:ext cx="0" cy="4295009"/>
-          </a:xfrm>
-          <a:prstGeom prst="straightConnector1">
-            <a:avLst/>
-          </a:prstGeom>
-          <a:ln>
-            <a:headEnd type="triangle"/>
-            <a:tailEnd type="triangle"/>
-          </a:ln>
-        </p:spPr>
-        <p:style>
-          <a:lnRef idx="1">
-            <a:schemeClr val="dk1"/>
-          </a:lnRef>
-          <a:fillRef idx="0">
-            <a:schemeClr val="dk1"/>
-          </a:fillRef>
-          <a:effectRef idx="0">
-            <a:schemeClr val="dk1"/>
-          </a:effectRef>
-          <a:fontRef idx="minor">
-            <a:schemeClr val="tx1"/>
-          </a:fontRef>
-        </p:style>
-      </p:cxnSp>
-      <p:cxnSp>
-        <p:nvCxnSpPr>
-          <p:cNvPr id="66" name="Straight Arrow Connector 65"/>
-          <p:cNvCxnSpPr/>
-          <p:nvPr/>
-        </p:nvCxnSpPr>
-        <p:spPr>
-          <a:xfrm flipH="1">
-            <a:off x="1265163" y="4928030"/>
-            <a:ext cx="0" cy="801298"/>
-          </a:xfrm>
-          <a:prstGeom prst="straightConnector1">
-            <a:avLst/>
-          </a:prstGeom>
-          <a:ln w="38100">
-            <a:headEnd type="triangle"/>
-            <a:tailEnd type="triangle"/>
-          </a:ln>
-        </p:spPr>
-        <p:style>
-          <a:lnRef idx="1">
-            <a:schemeClr val="accent1"/>
-          </a:lnRef>
-          <a:fillRef idx="0">
-            <a:schemeClr val="accent1"/>
-          </a:fillRef>
-          <a:effectRef idx="0">
-            <a:schemeClr val="accent1"/>
-          </a:effectRef>
-          <a:fontRef idx="minor">
-            <a:schemeClr val="tx1"/>
-          </a:fontRef>
-        </p:style>
-      </p:cxnSp>
-      <p:sp>
-        <p:nvSpPr>
-          <p:cNvPr id="68" name="TextBox 67"/>
+      </p:pic>
+      <p:sp>
+        <p:nvSpPr>
+          <p:cNvPr id="2" name="TextBox 1"/>
           <p:cNvSpPr txBox="1"/>
           <p:nvPr/>
         </p:nvSpPr>
         <p:spPr>
           <a:xfrm>
-            <a:off x="1289651" y="5270565"/>
-            <a:ext cx="1689221" cy="261610"/>
+            <a:off x="8377382" y="1514764"/>
+            <a:ext cx="3602182" cy="5447645"/>
           </a:xfrm>
           <a:prstGeom prst="rect">
             <a:avLst/>
@@ -5986,2446 +5024,256 @@
           </a:bodyPr>
           <a:lstStyle/>
           <a:p>
-            <a:r>
-              <a:rPr lang="en-US" sz="1100" u="sng" dirty="0" smtClean="0"/>
-              <a:t>1, 2, 3, 4, 5, 7</a:t>
-            </a:r>
-            <a:endParaRPr lang="en-SG" sz="1100" u="sng" dirty="0"/>
-          </a:p>
-        </p:txBody>
-      </p:sp>
-      <p:sp>
-        <p:nvSpPr>
-          <p:cNvPr id="76" name="Rectangle 75"/>
-          <p:cNvSpPr/>
+            <a:pPr marL="342900" indent="-342900">
+              <a:buAutoNum type="arabicPeriod"/>
+            </a:pPr>
+            <a:r>
+              <a:rPr lang="en-SG" sz="1400" b="1" dirty="0" smtClean="0"/>
+              <a:t>What </a:t>
+            </a:r>
+            <a:r>
+              <a:rPr lang="en-SG" sz="1400" b="1" dirty="0"/>
+              <a:t>is </a:t>
+            </a:r>
+            <a:r>
+              <a:rPr lang="en-SG" sz="1400" b="1" dirty="0" smtClean="0"/>
+              <a:t>the demo:</a:t>
+            </a:r>
+          </a:p>
+          <a:p>
+            <a:r>
+              <a:rPr lang="en-SG" sz="1200" dirty="0"/>
+              <a:t>Gateway </a:t>
+            </a:r>
+            <a:r>
+              <a:rPr lang="en-SG" sz="1200" dirty="0" smtClean="0"/>
+              <a:t>Attestation</a:t>
+            </a:r>
+          </a:p>
+          <a:p>
+            <a:endParaRPr lang="en-SG" sz="1400" dirty="0" smtClean="0"/>
+          </a:p>
+          <a:p>
+            <a:r>
+              <a:rPr lang="en-US" sz="1400" b="1" dirty="0" smtClean="0"/>
+              <a:t>2. </a:t>
+            </a:r>
+            <a:r>
+              <a:rPr lang="en-SG" sz="1400" b="1" dirty="0"/>
+              <a:t>how does it </a:t>
+            </a:r>
+            <a:r>
+              <a:rPr lang="en-SG" sz="1400" b="1" dirty="0" smtClean="0"/>
+              <a:t>work: </a:t>
+            </a:r>
+          </a:p>
+          <a:p>
+            <a:r>
+              <a:rPr lang="en-US" sz="1200" dirty="0"/>
+              <a:t>We proposed a firmware integrity check monitor by using Trusted </a:t>
+            </a:r>
+            <a:r>
+              <a:rPr lang="en-US" sz="1200" dirty="0" smtClean="0"/>
+              <a:t>Execution Environment </a:t>
+            </a:r>
+            <a:r>
+              <a:rPr lang="en-US" sz="1200" dirty="0"/>
+              <a:t>(TEE). It is designed as companion to a non-secure Linux </a:t>
+            </a:r>
+            <a:r>
+              <a:rPr lang="en-US" sz="1200" dirty="0" smtClean="0"/>
+              <a:t>kernel running </a:t>
+            </a:r>
+            <a:r>
+              <a:rPr lang="en-US" sz="1200" dirty="0"/>
+              <a:t>on Arm processor. Our program will perform the firmware </a:t>
+            </a:r>
+            <a:r>
+              <a:rPr lang="en-US" sz="1200" dirty="0" smtClean="0"/>
+              <a:t>attestation and </a:t>
+            </a:r>
+            <a:r>
+              <a:rPr lang="en-US" sz="1200" dirty="0"/>
+              <a:t>generate signature/check-sum in the embedded computer’s secure </a:t>
+            </a:r>
+            <a:r>
+              <a:rPr lang="en-US" sz="1200" dirty="0" smtClean="0"/>
+              <a:t>word, encrypt </a:t>
+            </a:r>
+            <a:r>
+              <a:rPr lang="en-US" sz="1200" dirty="0"/>
+              <a:t>and send the result to server through TCP. The sever will </a:t>
+            </a:r>
+            <a:r>
+              <a:rPr lang="en-US" sz="1200" dirty="0" smtClean="0"/>
+              <a:t>compare the </a:t>
+            </a:r>
+            <a:r>
+              <a:rPr lang="en-US" sz="1200" dirty="0"/>
+              <a:t>data with its own calculated result to do the integrity authorization</a:t>
+            </a:r>
+            <a:r>
+              <a:rPr lang="en-US" sz="1200" dirty="0" smtClean="0"/>
+              <a:t>.</a:t>
+            </a:r>
+          </a:p>
+          <a:p>
+            <a:endParaRPr lang="en-US" sz="1400" dirty="0" smtClean="0"/>
+          </a:p>
+          <a:p>
+            <a:r>
+              <a:rPr lang="en-US" sz="1400" b="1" dirty="0" smtClean="0"/>
+              <a:t>3. What are the requirements:  </a:t>
+            </a:r>
+          </a:p>
+          <a:p>
+            <a:r>
+              <a:rPr lang="en-US" sz="1200" dirty="0"/>
+              <a:t>Trust-Application [Raspberry PI secure world]: To do the AES-256 </a:t>
+            </a:r>
+            <a:r>
+              <a:rPr lang="en-US" sz="1200" dirty="0" smtClean="0"/>
+              <a:t>Key selection</a:t>
+            </a:r>
+            <a:r>
+              <a:rPr lang="en-US" sz="1200" dirty="0"/>
+              <a:t>, message encryption/decryption and file SWATT </a:t>
+            </a:r>
+            <a:r>
+              <a:rPr lang="en-US" sz="1200" dirty="0" smtClean="0"/>
+              <a:t>signature/check-sum calculation </a:t>
+            </a:r>
+            <a:r>
+              <a:rPr lang="en-US" sz="1200" dirty="0"/>
+              <a:t>.</a:t>
+            </a:r>
+          </a:p>
+          <a:p>
+            <a:r>
+              <a:rPr lang="en-US" sz="1200" dirty="0"/>
+              <a:t>2. Trust-Client [Raspberry PI normal world]: The client program to load</a:t>
+            </a:r>
+          </a:p>
+          <a:p>
+            <a:r>
+              <a:rPr lang="en-US" sz="1200" dirty="0"/>
+              <a:t>configure file, connect to the trust application, fetch the file need to check </a:t>
+            </a:r>
+            <a:r>
+              <a:rPr lang="en-US" sz="1200" dirty="0" smtClean="0"/>
+              <a:t>and connect </a:t>
+            </a:r>
+            <a:r>
+              <a:rPr lang="en-US" sz="1200" dirty="0"/>
+              <a:t>to the server through TCP.</a:t>
+            </a:r>
+          </a:p>
+          <a:p>
+            <a:r>
+              <a:rPr lang="en-US" sz="1200" dirty="0"/>
+              <a:t>3. Trust-Server [Server computer]: The server program to generate </a:t>
+            </a:r>
+            <a:r>
+              <a:rPr lang="en-US" sz="1200" dirty="0" err="1" smtClean="0"/>
+              <a:t>commu-nication</a:t>
+            </a:r>
+            <a:r>
+              <a:rPr lang="en-US" sz="1200" dirty="0" smtClean="0"/>
+              <a:t> </a:t>
+            </a:r>
+            <a:r>
+              <a:rPr lang="en-US" sz="1200" dirty="0"/>
+              <a:t>session key, authorize the Integrity of the file and connect to </a:t>
+            </a:r>
+            <a:r>
+              <a:rPr lang="en-US" sz="1200" dirty="0" smtClean="0"/>
+              <a:t>database to </a:t>
+            </a:r>
+            <a:r>
+              <a:rPr lang="en-US" sz="1200" dirty="0"/>
+              <a:t>save/load related </a:t>
+            </a:r>
+            <a:r>
+              <a:rPr lang="en-US" sz="1200" dirty="0" smtClean="0"/>
+              <a:t>data</a:t>
+            </a:r>
+            <a:endParaRPr lang="en-US" sz="1200" dirty="0"/>
+          </a:p>
+        </p:txBody>
+      </p:sp>
+      <p:pic>
+        <p:nvPicPr>
+          <p:cNvPr id="4" name="Picture 3"/>
+          <p:cNvPicPr>
+            <a:picLocks noChangeAspect="1"/>
+          </p:cNvPicPr>
           <p:nvPr/>
-        </p:nvSpPr>
-        <p:spPr>
-          <a:xfrm>
-            <a:off x="5360039" y="1592388"/>
-            <a:ext cx="1390389" cy="249531"/>
+        </p:nvPicPr>
+        <p:blipFill>
+          <a:blip r:embed="rId4"/>
+          <a:stretch>
+            <a:fillRect/>
+          </a:stretch>
+        </p:blipFill>
+        <p:spPr>
+          <a:xfrm>
+            <a:off x="225308" y="1514764"/>
+            <a:ext cx="8050983" cy="4402482"/>
           </a:xfrm>
           <a:prstGeom prst="rect">
             <a:avLst/>
           </a:prstGeom>
         </p:spPr>
-        <p:style>
-          <a:lnRef idx="2">
-            <a:schemeClr val="accent1">
-              <a:shade val="50000"/>
-            </a:schemeClr>
-          </a:lnRef>
-          <a:fillRef idx="1">
-            <a:schemeClr val="accent1"/>
-          </a:fillRef>
-          <a:effectRef idx="0">
-            <a:schemeClr val="accent1"/>
-          </a:effectRef>
-          <a:fontRef idx="minor">
-            <a:schemeClr val="lt1"/>
-          </a:fontRef>
-        </p:style>
-        <p:txBody>
-          <a:bodyPr rtlCol="0" anchor="ctr"/>
-          <a:lstStyle/>
-          <a:p>
-            <a:r>
-              <a:rPr lang="en-US" sz="800" b="1" dirty="0" smtClean="0"/>
-              <a:t>2</a:t>
-            </a:r>
-            <a:r>
-              <a:rPr lang="en-US" sz="800" b="1" dirty="0"/>
-              <a:t> </a:t>
-            </a:r>
-            <a:r>
-              <a:rPr lang="en-US" sz="800" b="1" dirty="0" smtClean="0"/>
-              <a:t>– Log in to the  trust server</a:t>
-            </a:r>
-            <a:endParaRPr lang="en-SG" sz="800" b="1" dirty="0"/>
-          </a:p>
-        </p:txBody>
-      </p:sp>
-      <p:sp>
-        <p:nvSpPr>
-          <p:cNvPr id="82" name="Rectangle 81"/>
+      </p:pic>
+      <p:sp>
+        <p:nvSpPr>
+          <p:cNvPr id="14" name="Rectangle 13"/>
           <p:cNvSpPr/>
           <p:nvPr/>
         </p:nvSpPr>
         <p:spPr>
           <a:xfrm>
-            <a:off x="9484443" y="386262"/>
-            <a:ext cx="936755" cy="249531"/>
+            <a:off x="502298" y="1098074"/>
+            <a:ext cx="6096000" cy="338554"/>
           </a:xfrm>
           <a:prstGeom prst="rect">
             <a:avLst/>
           </a:prstGeom>
         </p:spPr>
-        <p:style>
-          <a:lnRef idx="2">
-            <a:schemeClr val="accent1">
-              <a:shade val="50000"/>
-            </a:schemeClr>
-          </a:lnRef>
-          <a:fillRef idx="1">
-            <a:schemeClr val="accent1"/>
-          </a:fillRef>
-          <a:effectRef idx="0">
-            <a:schemeClr val="accent1"/>
-          </a:effectRef>
-          <a:fontRef idx="minor">
-            <a:schemeClr val="lt1"/>
-          </a:fontRef>
-        </p:style>
-        <p:txBody>
-          <a:bodyPr rtlCol="0" anchor="ctr"/>
-          <a:lstStyle/>
-          <a:p>
-            <a:r>
-              <a:rPr lang="en-US" sz="800" b="1" dirty="0" smtClean="0"/>
-              <a:t>Main server start  </a:t>
-            </a:r>
-            <a:endParaRPr lang="en-SG" sz="800" b="1" dirty="0"/>
-          </a:p>
-        </p:txBody>
-      </p:sp>
-      <p:sp>
-        <p:nvSpPr>
-          <p:cNvPr id="83" name="Rectangle 82"/>
-          <p:cNvSpPr/>
-          <p:nvPr/>
-        </p:nvSpPr>
-        <p:spPr>
-          <a:xfrm>
-            <a:off x="10167871" y="-2631301"/>
-            <a:ext cx="923884" cy="244238"/>
-          </a:xfrm>
-          <a:prstGeom prst="rect">
-            <a:avLst/>
-          </a:prstGeom>
-        </p:spPr>
-        <p:style>
-          <a:lnRef idx="2">
-            <a:schemeClr val="accent1">
-              <a:shade val="50000"/>
-            </a:schemeClr>
-          </a:lnRef>
-          <a:fillRef idx="1">
-            <a:schemeClr val="accent1"/>
-          </a:fillRef>
-          <a:effectRef idx="0">
-            <a:schemeClr val="accent1"/>
-          </a:effectRef>
-          <a:fontRef idx="minor">
-            <a:schemeClr val="lt1"/>
-          </a:fontRef>
-        </p:style>
-        <p:txBody>
-          <a:bodyPr rtlCol="0" anchor="ctr"/>
-          <a:lstStyle/>
-          <a:p>
-            <a:r>
-              <a:rPr lang="en-US" sz="800" b="1" dirty="0" smtClean="0"/>
-              <a:t>Load AES256 key + IV</a:t>
-            </a:r>
-            <a:endParaRPr lang="en-SG" sz="800" b="1" dirty="0"/>
-          </a:p>
-        </p:txBody>
-      </p:sp>
-      <p:cxnSp>
-        <p:nvCxnSpPr>
-          <p:cNvPr id="84" name="Straight Arrow Connector 83"/>
-          <p:cNvCxnSpPr/>
-          <p:nvPr/>
-        </p:nvCxnSpPr>
-        <p:spPr>
-          <a:xfrm>
-            <a:off x="9943839" y="645894"/>
-            <a:ext cx="0" cy="369896"/>
-          </a:xfrm>
-          <a:prstGeom prst="straightConnector1">
-            <a:avLst/>
-          </a:prstGeom>
-          <a:ln w="38100">
-            <a:tailEnd type="triangle"/>
-          </a:ln>
-        </p:spPr>
-        <p:style>
-          <a:lnRef idx="1">
-            <a:schemeClr val="accent1"/>
-          </a:lnRef>
-          <a:fillRef idx="0">
-            <a:schemeClr val="accent1"/>
-          </a:fillRef>
-          <a:effectRef idx="0">
-            <a:schemeClr val="accent1"/>
-          </a:effectRef>
-          <a:fontRef idx="minor">
-            <a:schemeClr val="tx1"/>
-          </a:fontRef>
-        </p:style>
-      </p:cxnSp>
-      <p:sp>
-        <p:nvSpPr>
-          <p:cNvPr id="85" name="TextBox 84"/>
-          <p:cNvSpPr txBox="1"/>
-          <p:nvPr/>
-        </p:nvSpPr>
-        <p:spPr>
-          <a:xfrm>
-            <a:off x="6746855" y="1460576"/>
-            <a:ext cx="2964519" cy="338554"/>
-          </a:xfrm>
-          <a:prstGeom prst="rect">
-            <a:avLst/>
-          </a:prstGeom>
-          <a:noFill/>
-        </p:spPr>
-        <p:txBody>
-          <a:bodyPr wrap="square" rtlCol="0">
+        <p:txBody>
+          <a:bodyPr>
             <a:spAutoFit/>
           </a:bodyPr>
           <a:lstStyle/>
           <a:p>
             <a:r>
-              <a:rPr lang="en-US" sz="800" b="1" u="sng" dirty="0" smtClean="0">
-                <a:solidFill>
-                  <a:srgbClr val="C00000"/>
-                </a:solidFill>
-              </a:rPr>
-              <a:t>Login request:  </a:t>
-            </a:r>
-            <a:r>
-              <a:rPr lang="en-US" sz="800" b="1" u="sng" dirty="0" err="1" smtClean="0">
-                <a:solidFill>
-                  <a:srgbClr val="C00000"/>
-                </a:solidFill>
-              </a:rPr>
-              <a:t>F;Gateway_ID;Program_V;Key_Version;C_Len</a:t>
-            </a:r>
-            <a:r>
-              <a:rPr lang="en-US" sz="800" b="1" u="sng" dirty="0" smtClean="0">
-                <a:solidFill>
-                  <a:srgbClr val="C00000"/>
-                </a:solidFill>
-              </a:rPr>
-              <a:t>, m, n  </a:t>
-            </a:r>
-            <a:endParaRPr lang="en-SG" sz="800" b="1" u="sng" dirty="0">
-              <a:solidFill>
-                <a:srgbClr val="C00000"/>
-              </a:solidFill>
-            </a:endParaRPr>
-          </a:p>
-        </p:txBody>
-      </p:sp>
-      <p:sp>
-        <p:nvSpPr>
-          <p:cNvPr id="87" name="Rectangle 86"/>
-          <p:cNvSpPr/>
-          <p:nvPr/>
-        </p:nvSpPr>
-        <p:spPr>
-          <a:xfrm>
-            <a:off x="9733616" y="1512326"/>
-            <a:ext cx="920833" cy="249531"/>
-          </a:xfrm>
-          <a:prstGeom prst="rect">
-            <a:avLst/>
-          </a:prstGeom>
-        </p:spPr>
-        <p:style>
-          <a:lnRef idx="2">
-            <a:schemeClr val="accent1">
-              <a:shade val="50000"/>
-            </a:schemeClr>
-          </a:lnRef>
-          <a:fillRef idx="1">
-            <a:schemeClr val="accent1"/>
-          </a:fillRef>
-          <a:effectRef idx="0">
-            <a:schemeClr val="accent1"/>
-          </a:effectRef>
-          <a:fontRef idx="minor">
-            <a:schemeClr val="lt1"/>
-          </a:fontRef>
-        </p:style>
-        <p:txBody>
-          <a:bodyPr rtlCol="0" anchor="ctr"/>
-          <a:lstStyle/>
-          <a:p>
-            <a:r>
-              <a:rPr lang="en-US" sz="800" b="1" dirty="0" smtClean="0"/>
-              <a:t>2.1 confirm log in </a:t>
-            </a:r>
-            <a:endParaRPr lang="en-SG" sz="800" b="1" dirty="0"/>
-          </a:p>
-        </p:txBody>
-      </p:sp>
-      <p:sp>
-        <p:nvSpPr>
-          <p:cNvPr id="89" name="Rectangle 88"/>
-          <p:cNvSpPr/>
-          <p:nvPr/>
-        </p:nvSpPr>
-        <p:spPr>
-          <a:xfrm>
-            <a:off x="9214631" y="1892242"/>
-            <a:ext cx="1000687" cy="249531"/>
-          </a:xfrm>
-          <a:prstGeom prst="rect">
-            <a:avLst/>
-          </a:prstGeom>
-        </p:spPr>
-        <p:style>
-          <a:lnRef idx="2">
-            <a:schemeClr val="accent1">
-              <a:shade val="50000"/>
-            </a:schemeClr>
-          </a:lnRef>
-          <a:fillRef idx="1">
-            <a:schemeClr val="accent1"/>
-          </a:fillRef>
-          <a:effectRef idx="0">
-            <a:schemeClr val="accent1"/>
-          </a:effectRef>
-          <a:fontRef idx="minor">
-            <a:schemeClr val="lt1"/>
-          </a:fontRef>
-        </p:style>
-        <p:txBody>
-          <a:bodyPr rtlCol="0" anchor="ctr"/>
-          <a:lstStyle/>
-          <a:p>
-            <a:r>
-              <a:rPr lang="en-US" sz="800" b="1" dirty="0" smtClean="0"/>
-              <a:t>2.1.1 Log in reject. </a:t>
-            </a:r>
-            <a:endParaRPr lang="en-SG" sz="800" b="1" dirty="0"/>
-          </a:p>
-        </p:txBody>
-      </p:sp>
-      <p:cxnSp>
-        <p:nvCxnSpPr>
-          <p:cNvPr id="51" name="Elbow Connector 50"/>
-          <p:cNvCxnSpPr>
-            <a:endCxn id="42" idx="0"/>
-          </p:cNvCxnSpPr>
-          <p:nvPr/>
-        </p:nvCxnSpPr>
-        <p:spPr>
-          <a:xfrm>
-            <a:off x="10654449" y="1637091"/>
-            <a:ext cx="626941" cy="233681"/>
-          </a:xfrm>
-          <a:prstGeom prst="bentConnector2">
-            <a:avLst/>
-          </a:prstGeom>
-          <a:ln>
-            <a:tailEnd type="triangle"/>
-          </a:ln>
-        </p:spPr>
-        <p:style>
-          <a:lnRef idx="1">
-            <a:schemeClr val="accent1"/>
-          </a:lnRef>
-          <a:fillRef idx="0">
-            <a:schemeClr val="accent1"/>
-          </a:fillRef>
-          <a:effectRef idx="0">
-            <a:schemeClr val="accent1"/>
-          </a:effectRef>
-          <a:fontRef idx="minor">
-            <a:schemeClr val="tx1"/>
-          </a:fontRef>
-        </p:style>
-      </p:cxnSp>
-      <p:cxnSp>
-        <p:nvCxnSpPr>
-          <p:cNvPr id="61" name="Straight Arrow Connector 60"/>
-          <p:cNvCxnSpPr/>
-          <p:nvPr/>
-        </p:nvCxnSpPr>
-        <p:spPr>
-          <a:xfrm flipH="1">
-            <a:off x="7661787" y="2220685"/>
-            <a:ext cx="2795028" cy="0"/>
-          </a:xfrm>
-          <a:prstGeom prst="straightConnector1">
-            <a:avLst/>
-          </a:prstGeom>
-          <a:ln>
-            <a:tailEnd type="triangle"/>
-          </a:ln>
-        </p:spPr>
-        <p:style>
-          <a:lnRef idx="1">
-            <a:schemeClr val="accent1"/>
-          </a:lnRef>
-          <a:fillRef idx="0">
-            <a:schemeClr val="accent1"/>
-          </a:fillRef>
-          <a:effectRef idx="0">
-            <a:schemeClr val="accent1"/>
-          </a:effectRef>
-          <a:fontRef idx="minor">
-            <a:schemeClr val="tx1"/>
-          </a:fontRef>
-        </p:style>
-      </p:cxnSp>
-      <p:cxnSp>
-        <p:nvCxnSpPr>
-          <p:cNvPr id="94" name="Elbow Connector 93"/>
-          <p:cNvCxnSpPr/>
-          <p:nvPr/>
-        </p:nvCxnSpPr>
-        <p:spPr>
-          <a:xfrm rot="10800000" flipV="1">
-            <a:off x="8229600" y="1994262"/>
-            <a:ext cx="970268" cy="226423"/>
-          </a:xfrm>
-          <a:prstGeom prst="bentConnector3">
-            <a:avLst/>
-          </a:prstGeom>
-          <a:ln>
-            <a:tailEnd type="triangle"/>
-          </a:ln>
-        </p:spPr>
-        <p:style>
-          <a:lnRef idx="1">
-            <a:schemeClr val="accent1"/>
-          </a:lnRef>
-          <a:fillRef idx="0">
-            <a:schemeClr val="accent1"/>
-          </a:fillRef>
-          <a:effectRef idx="0">
-            <a:schemeClr val="accent1"/>
-          </a:effectRef>
-          <a:fontRef idx="minor">
-            <a:schemeClr val="tx1"/>
-          </a:fontRef>
-        </p:style>
-      </p:cxnSp>
-      <p:sp>
-        <p:nvSpPr>
-          <p:cNvPr id="95" name="Rectangle 94"/>
-          <p:cNvSpPr/>
-          <p:nvPr/>
-        </p:nvSpPr>
-        <p:spPr>
-          <a:xfrm>
-            <a:off x="10413085" y="3356171"/>
-            <a:ext cx="1249413" cy="249531"/>
-          </a:xfrm>
-          <a:prstGeom prst="rect">
-            <a:avLst/>
-          </a:prstGeom>
-        </p:spPr>
-        <p:style>
-          <a:lnRef idx="2">
-            <a:schemeClr val="accent1">
-              <a:shade val="50000"/>
-            </a:schemeClr>
-          </a:lnRef>
-          <a:fillRef idx="1">
-            <a:schemeClr val="accent1"/>
-          </a:fillRef>
-          <a:effectRef idx="0">
-            <a:schemeClr val="accent1"/>
-          </a:effectRef>
-          <a:fontRef idx="minor">
-            <a:schemeClr val="lt1"/>
-          </a:fontRef>
-        </p:style>
-        <p:txBody>
-          <a:bodyPr rtlCol="0" anchor="ctr"/>
-          <a:lstStyle/>
-          <a:p>
-            <a:r>
-              <a:rPr lang="en-US" sz="800" b="1" dirty="0" smtClean="0"/>
-              <a:t>2.4 Calculate the file SWATT </a:t>
-            </a:r>
-            <a:endParaRPr lang="en-SG" sz="800" b="1" dirty="0"/>
-          </a:p>
-        </p:txBody>
-      </p:sp>
-      <p:sp>
-        <p:nvSpPr>
-          <p:cNvPr id="96" name="Flowchart: Magnetic Disk 95"/>
-          <p:cNvSpPr/>
-          <p:nvPr/>
-        </p:nvSpPr>
-        <p:spPr>
-          <a:xfrm>
-            <a:off x="11084659" y="327378"/>
-            <a:ext cx="804154" cy="307756"/>
-          </a:xfrm>
-          <a:prstGeom prst="flowChartMagneticDisk">
-            <a:avLst/>
-          </a:prstGeom>
-        </p:spPr>
-        <p:style>
-          <a:lnRef idx="2">
-            <a:schemeClr val="accent1">
-              <a:shade val="50000"/>
-            </a:schemeClr>
-          </a:lnRef>
-          <a:fillRef idx="1">
-            <a:schemeClr val="accent1"/>
-          </a:fillRef>
-          <a:effectRef idx="0">
-            <a:schemeClr val="accent1"/>
-          </a:effectRef>
-          <a:fontRef idx="minor">
-            <a:schemeClr val="lt1"/>
-          </a:fontRef>
-        </p:style>
-        <p:txBody>
-          <a:bodyPr rtlCol="0" anchor="ctr"/>
-          <a:lstStyle/>
-          <a:p>
-            <a:r>
-              <a:rPr lang="en-US" sz="800" b="1" dirty="0" smtClean="0"/>
-              <a:t>Database</a:t>
-            </a:r>
-            <a:endParaRPr lang="en-SG" sz="800" b="1" dirty="0"/>
-          </a:p>
-        </p:txBody>
-      </p:sp>
-      <p:cxnSp>
-        <p:nvCxnSpPr>
-          <p:cNvPr id="97" name="Straight Arrow Connector 96"/>
-          <p:cNvCxnSpPr/>
-          <p:nvPr/>
-        </p:nvCxnSpPr>
-        <p:spPr>
-          <a:xfrm flipH="1" flipV="1">
-            <a:off x="11377424" y="621315"/>
-            <a:ext cx="0" cy="1220604"/>
-          </a:xfrm>
-          <a:prstGeom prst="straightConnector1">
-            <a:avLst/>
-          </a:prstGeom>
-          <a:ln>
-            <a:tailEnd type="triangle"/>
-          </a:ln>
-        </p:spPr>
-        <p:style>
-          <a:lnRef idx="1">
-            <a:schemeClr val="accent1"/>
-          </a:lnRef>
-          <a:fillRef idx="0">
-            <a:schemeClr val="accent1"/>
-          </a:fillRef>
-          <a:effectRef idx="0">
-            <a:schemeClr val="accent1"/>
-          </a:effectRef>
-          <a:fontRef idx="minor">
-            <a:schemeClr val="tx1"/>
-          </a:fontRef>
-        </p:style>
-      </p:cxnSp>
-      <p:sp>
-        <p:nvSpPr>
-          <p:cNvPr id="100" name="Rectangle 99"/>
-          <p:cNvSpPr/>
-          <p:nvPr/>
-        </p:nvSpPr>
-        <p:spPr>
-          <a:xfrm>
-            <a:off x="5498454" y="2049872"/>
-            <a:ext cx="2153050" cy="249531"/>
-          </a:xfrm>
-          <a:prstGeom prst="rect">
-            <a:avLst/>
-          </a:prstGeom>
-        </p:spPr>
-        <p:style>
-          <a:lnRef idx="2">
-            <a:schemeClr val="accent1">
-              <a:shade val="50000"/>
-            </a:schemeClr>
-          </a:lnRef>
-          <a:fillRef idx="1">
-            <a:schemeClr val="accent1"/>
-          </a:fillRef>
-          <a:effectRef idx="0">
-            <a:schemeClr val="accent1"/>
-          </a:effectRef>
-          <a:fontRef idx="minor">
-            <a:schemeClr val="lt1"/>
-          </a:fontRef>
-        </p:style>
-        <p:txBody>
-          <a:bodyPr rtlCol="0" anchor="ctr"/>
-          <a:lstStyle/>
-          <a:p>
-            <a:r>
-              <a:rPr lang="en-US" sz="800" b="1" u="sng" dirty="0" smtClean="0">
-                <a:solidFill>
-                  <a:srgbClr val="C00000"/>
-                </a:solidFill>
-              </a:rPr>
-              <a:t>2.3 Forward session key  </a:t>
-            </a:r>
-            <a:r>
-              <a:rPr lang="en-US" sz="800" b="1" u="sng" dirty="0" err="1" smtClean="0">
-                <a:solidFill>
-                  <a:srgbClr val="C00000"/>
-                </a:solidFill>
-              </a:rPr>
-              <a:t>msg</a:t>
-            </a:r>
-            <a:r>
-              <a:rPr lang="en-US" sz="800" b="1" u="sng" dirty="0" smtClean="0">
-                <a:solidFill>
-                  <a:srgbClr val="C00000"/>
-                </a:solidFill>
-              </a:rPr>
-              <a:t> to TA(</a:t>
-            </a:r>
-            <a:r>
-              <a:rPr lang="en-US" sz="800" b="1" u="sng" dirty="0" err="1" smtClean="0">
-                <a:solidFill>
-                  <a:srgbClr val="C00000"/>
-                </a:solidFill>
-              </a:rPr>
-              <a:t>TrustZone</a:t>
-            </a:r>
-            <a:r>
-              <a:rPr lang="en-US" sz="800" b="1" u="sng" dirty="0" smtClean="0">
-                <a:solidFill>
-                  <a:srgbClr val="C00000"/>
-                </a:solidFill>
-              </a:rPr>
-              <a:t>)</a:t>
-            </a:r>
-            <a:endParaRPr lang="en-SG" sz="800" b="1" u="sng" dirty="0">
-              <a:solidFill>
-                <a:srgbClr val="C00000"/>
-              </a:solidFill>
-            </a:endParaRPr>
-          </a:p>
-        </p:txBody>
-      </p:sp>
-      <p:sp>
-        <p:nvSpPr>
-          <p:cNvPr id="105" name="TextBox 104"/>
-          <p:cNvSpPr txBox="1"/>
-          <p:nvPr/>
-        </p:nvSpPr>
-        <p:spPr>
-          <a:xfrm>
-            <a:off x="7447517" y="5590231"/>
-            <a:ext cx="244548" cy="253916"/>
-          </a:xfrm>
-          <a:prstGeom prst="rect">
-            <a:avLst/>
-          </a:prstGeom>
-          <a:noFill/>
-        </p:spPr>
-        <p:txBody>
-          <a:bodyPr wrap="square" rtlCol="0">
-            <a:spAutoFit/>
-          </a:bodyPr>
-          <a:lstStyle/>
-          <a:p>
-            <a:r>
-              <a:rPr lang="en-US" sz="1050" u="sng" dirty="0">
-                <a:solidFill>
-                  <a:srgbClr val="C00000"/>
-                </a:solidFill>
-              </a:rPr>
-              <a:t>2</a:t>
-            </a:r>
-            <a:endParaRPr lang="en-SG" sz="1050" u="sng" dirty="0">
-              <a:solidFill>
-                <a:srgbClr val="C00000"/>
-              </a:solidFill>
-            </a:endParaRPr>
-          </a:p>
-        </p:txBody>
-      </p:sp>
-      <p:cxnSp>
-        <p:nvCxnSpPr>
-          <p:cNvPr id="106" name="Straight Arrow Connector 105"/>
-          <p:cNvCxnSpPr/>
-          <p:nvPr/>
-        </p:nvCxnSpPr>
-        <p:spPr>
-          <a:xfrm flipV="1">
-            <a:off x="4061027" y="2314594"/>
-            <a:ext cx="0" cy="3826005"/>
-          </a:xfrm>
-          <a:prstGeom prst="straightConnector1">
-            <a:avLst/>
-          </a:prstGeom>
-          <a:ln>
-            <a:tailEnd type="triangle"/>
-          </a:ln>
-        </p:spPr>
-        <p:style>
-          <a:lnRef idx="1">
-            <a:schemeClr val="dk1"/>
-          </a:lnRef>
-          <a:fillRef idx="0">
-            <a:schemeClr val="dk1"/>
-          </a:fillRef>
-          <a:effectRef idx="0">
-            <a:schemeClr val="dk1"/>
-          </a:effectRef>
-          <a:fontRef idx="minor">
-            <a:schemeClr val="tx1"/>
-          </a:fontRef>
-        </p:style>
-      </p:cxnSp>
-      <p:sp>
-        <p:nvSpPr>
-          <p:cNvPr id="112" name="Rectangle 111"/>
-          <p:cNvSpPr/>
-          <p:nvPr/>
-        </p:nvSpPr>
-        <p:spPr>
-          <a:xfrm>
-            <a:off x="3940535" y="2065063"/>
-            <a:ext cx="1448062" cy="249531"/>
-          </a:xfrm>
-          <a:prstGeom prst="rect">
-            <a:avLst/>
-          </a:prstGeom>
-        </p:spPr>
-        <p:style>
-          <a:lnRef idx="2">
-            <a:schemeClr val="accent1">
-              <a:shade val="50000"/>
-            </a:schemeClr>
-          </a:lnRef>
-          <a:fillRef idx="1">
-            <a:schemeClr val="accent1"/>
-          </a:fillRef>
-          <a:effectRef idx="0">
-            <a:schemeClr val="accent1"/>
-          </a:effectRef>
-          <a:fontRef idx="minor">
-            <a:schemeClr val="lt1"/>
-          </a:fontRef>
-        </p:style>
-        <p:txBody>
-          <a:bodyPr rtlCol="0" anchor="ctr"/>
-          <a:lstStyle/>
-          <a:p>
-            <a:r>
-              <a:rPr lang="en-US" sz="800" b="1" dirty="0" smtClean="0"/>
-              <a:t>3.1 Load file in memory and fetch bytes based on the </a:t>
-            </a:r>
-            <a:r>
-              <a:rPr lang="en-US" sz="800" b="1" dirty="0" err="1" smtClean="0"/>
-              <a:t>Addr</a:t>
-            </a:r>
-            <a:endParaRPr lang="en-SG" sz="800" b="1" dirty="0"/>
-          </a:p>
-        </p:txBody>
-      </p:sp>
-      <p:sp>
-        <p:nvSpPr>
-          <p:cNvPr id="113" name="TextBox 112"/>
-          <p:cNvSpPr txBox="1"/>
-          <p:nvPr/>
-        </p:nvSpPr>
-        <p:spPr>
-          <a:xfrm>
-            <a:off x="3874750" y="5582468"/>
-            <a:ext cx="477877" cy="415498"/>
-          </a:xfrm>
-          <a:prstGeom prst="rect">
-            <a:avLst/>
-          </a:prstGeom>
-          <a:noFill/>
-        </p:spPr>
-        <p:txBody>
-          <a:bodyPr wrap="square" rtlCol="0">
-            <a:spAutoFit/>
-          </a:bodyPr>
-          <a:lstStyle/>
-          <a:p>
-            <a:r>
-              <a:rPr lang="en-US" sz="1050" u="sng" dirty="0" smtClean="0"/>
-              <a:t>3 x m </a:t>
-            </a:r>
-          </a:p>
-          <a:p>
-            <a:r>
-              <a:rPr lang="en-US" sz="1050" u="sng" dirty="0" err="1" smtClean="0"/>
-              <a:t>Addr</a:t>
-            </a:r>
-            <a:r>
-              <a:rPr lang="en-US" sz="1050" u="sng" dirty="0" smtClean="0"/>
-              <a:t> </a:t>
-            </a:r>
-            <a:endParaRPr lang="en-SG" sz="1050" u="sng" dirty="0"/>
-          </a:p>
-        </p:txBody>
-      </p:sp>
-      <p:sp>
-        <p:nvSpPr>
-          <p:cNvPr id="120" name="Rectangle 119"/>
-          <p:cNvSpPr/>
-          <p:nvPr/>
-        </p:nvSpPr>
-        <p:spPr>
-          <a:xfrm>
-            <a:off x="4181520" y="2532365"/>
-            <a:ext cx="1655756" cy="249531"/>
-          </a:xfrm>
-          <a:prstGeom prst="rect">
-            <a:avLst/>
-          </a:prstGeom>
-        </p:spPr>
-        <p:style>
-          <a:lnRef idx="2">
-            <a:schemeClr val="accent1">
-              <a:shade val="50000"/>
-            </a:schemeClr>
-          </a:lnRef>
-          <a:fillRef idx="1">
-            <a:schemeClr val="accent1"/>
-          </a:fillRef>
-          <a:effectRef idx="0">
-            <a:schemeClr val="accent1"/>
-          </a:effectRef>
-          <a:fontRef idx="minor">
-            <a:schemeClr val="lt1"/>
-          </a:fontRef>
-        </p:style>
-        <p:txBody>
-          <a:bodyPr rtlCol="0" anchor="ctr"/>
-          <a:lstStyle/>
-          <a:p>
-            <a:r>
-              <a:rPr lang="en-US" sz="800" b="1" dirty="0"/>
-              <a:t>4</a:t>
-            </a:r>
-            <a:r>
-              <a:rPr lang="en-US" sz="800" b="1" dirty="0" smtClean="0"/>
-              <a:t>. Forward new </a:t>
-            </a:r>
-            <a:r>
-              <a:rPr lang="en-US" sz="800" b="1" dirty="0" err="1" smtClean="0"/>
-              <a:t>init</a:t>
-            </a:r>
-            <a:r>
-              <a:rPr lang="en-US" sz="800" b="1" dirty="0" smtClean="0"/>
-              <a:t> seed, swat-seed, state[n], file bytes to TA </a:t>
-            </a:r>
-            <a:endParaRPr lang="en-SG" sz="800" b="1" dirty="0"/>
-          </a:p>
-        </p:txBody>
-      </p:sp>
-      <p:cxnSp>
-        <p:nvCxnSpPr>
-          <p:cNvPr id="121" name="Straight Arrow Connector 120"/>
-          <p:cNvCxnSpPr/>
-          <p:nvPr/>
-        </p:nvCxnSpPr>
-        <p:spPr>
-          <a:xfrm>
-            <a:off x="4749738" y="2307279"/>
-            <a:ext cx="0" cy="205932"/>
-          </a:xfrm>
-          <a:prstGeom prst="straightConnector1">
-            <a:avLst/>
-          </a:prstGeom>
-          <a:ln>
-            <a:tailEnd type="triangle"/>
-          </a:ln>
-        </p:spPr>
-        <p:style>
-          <a:lnRef idx="1">
-            <a:schemeClr val="accent1"/>
-          </a:lnRef>
-          <a:fillRef idx="0">
-            <a:schemeClr val="accent1"/>
-          </a:fillRef>
-          <a:effectRef idx="0">
-            <a:schemeClr val="accent1"/>
-          </a:effectRef>
-          <a:fontRef idx="minor">
-            <a:schemeClr val="tx1"/>
-          </a:fontRef>
-        </p:style>
-      </p:cxnSp>
-      <p:cxnSp>
-        <p:nvCxnSpPr>
-          <p:cNvPr id="123" name="Straight Arrow Connector 122"/>
-          <p:cNvCxnSpPr/>
-          <p:nvPr/>
-        </p:nvCxnSpPr>
-        <p:spPr>
-          <a:xfrm flipH="1">
-            <a:off x="4423232" y="2801050"/>
-            <a:ext cx="0" cy="3327391"/>
-          </a:xfrm>
-          <a:prstGeom prst="straightConnector1">
-            <a:avLst/>
-          </a:prstGeom>
-          <a:ln>
-            <a:tailEnd type="triangle"/>
-          </a:ln>
-        </p:spPr>
-        <p:style>
-          <a:lnRef idx="1">
-            <a:schemeClr val="dk1"/>
-          </a:lnRef>
-          <a:fillRef idx="0">
-            <a:schemeClr val="dk1"/>
-          </a:fillRef>
-          <a:effectRef idx="0">
-            <a:schemeClr val="dk1"/>
-          </a:effectRef>
-          <a:fontRef idx="minor">
-            <a:schemeClr val="tx1"/>
-          </a:fontRef>
-        </p:style>
-      </p:cxnSp>
-      <p:sp>
-        <p:nvSpPr>
-          <p:cNvPr id="126" name="TextBox 125"/>
-          <p:cNvSpPr txBox="1"/>
-          <p:nvPr/>
-        </p:nvSpPr>
-        <p:spPr>
-          <a:xfrm>
-            <a:off x="4246663" y="5590231"/>
-            <a:ext cx="482453" cy="253916"/>
-          </a:xfrm>
-          <a:prstGeom prst="rect">
-            <a:avLst/>
-          </a:prstGeom>
-          <a:noFill/>
-        </p:spPr>
-        <p:txBody>
-          <a:bodyPr wrap="square" rtlCol="0">
-            <a:spAutoFit/>
-          </a:bodyPr>
-          <a:lstStyle/>
-          <a:p>
-            <a:r>
-              <a:rPr lang="en-US" sz="1050" u="sng" dirty="0" smtClean="0"/>
-              <a:t>4 x m</a:t>
-            </a:r>
-            <a:endParaRPr lang="en-SG" sz="1050" u="sng" dirty="0"/>
-          </a:p>
-        </p:txBody>
-      </p:sp>
-      <p:sp>
-        <p:nvSpPr>
-          <p:cNvPr id="128" name="Rectangle 127"/>
-          <p:cNvSpPr/>
-          <p:nvPr/>
-        </p:nvSpPr>
-        <p:spPr>
-          <a:xfrm>
-            <a:off x="4744963" y="3195951"/>
-            <a:ext cx="1596726" cy="249531"/>
-          </a:xfrm>
-          <a:prstGeom prst="rect">
-            <a:avLst/>
-          </a:prstGeom>
-        </p:spPr>
-        <p:style>
-          <a:lnRef idx="2">
-            <a:schemeClr val="accent1">
-              <a:shade val="50000"/>
-            </a:schemeClr>
-          </a:lnRef>
-          <a:fillRef idx="1">
-            <a:schemeClr val="accent1"/>
-          </a:fillRef>
-          <a:effectRef idx="0">
-            <a:schemeClr val="accent1"/>
-          </a:effectRef>
-          <a:fontRef idx="minor">
-            <a:schemeClr val="lt1"/>
-          </a:fontRef>
-        </p:style>
-        <p:txBody>
-          <a:bodyPr rtlCol="0" anchor="ctr"/>
-          <a:lstStyle/>
-          <a:p>
-            <a:r>
-              <a:rPr lang="en-US" sz="800" b="1" dirty="0"/>
-              <a:t>5</a:t>
-            </a:r>
-            <a:r>
-              <a:rPr lang="en-US" sz="800" b="1" dirty="0" smtClean="0"/>
-              <a:t>. Load the encrypted </a:t>
-            </a:r>
-            <a:r>
-              <a:rPr lang="en-US" sz="800" b="1" dirty="0" err="1" smtClean="0"/>
-              <a:t>swatt</a:t>
-            </a:r>
-            <a:r>
-              <a:rPr lang="en-US" sz="800" b="1" dirty="0" smtClean="0"/>
-              <a:t> </a:t>
-            </a:r>
-            <a:r>
-              <a:rPr lang="en-US" sz="800" b="1" dirty="0" err="1" smtClean="0"/>
-              <a:t>msg</a:t>
-            </a:r>
-            <a:endParaRPr lang="en-SG" sz="800" b="1" dirty="0"/>
-          </a:p>
-        </p:txBody>
-      </p:sp>
-      <p:cxnSp>
-        <p:nvCxnSpPr>
-          <p:cNvPr id="129" name="Straight Arrow Connector 128"/>
-          <p:cNvCxnSpPr/>
-          <p:nvPr/>
-        </p:nvCxnSpPr>
-        <p:spPr>
-          <a:xfrm flipV="1">
-            <a:off x="4853069" y="3480936"/>
-            <a:ext cx="0" cy="2659665"/>
-          </a:xfrm>
-          <a:prstGeom prst="straightConnector1">
-            <a:avLst/>
-          </a:prstGeom>
-          <a:ln>
-            <a:tailEnd type="triangle"/>
-          </a:ln>
-        </p:spPr>
-        <p:style>
-          <a:lnRef idx="1">
-            <a:schemeClr val="dk1"/>
-          </a:lnRef>
-          <a:fillRef idx="0">
-            <a:schemeClr val="dk1"/>
-          </a:fillRef>
-          <a:effectRef idx="0">
-            <a:schemeClr val="dk1"/>
-          </a:effectRef>
-          <a:fontRef idx="minor">
-            <a:schemeClr val="tx1"/>
-          </a:fontRef>
-        </p:style>
-      </p:cxnSp>
-      <p:sp>
-        <p:nvSpPr>
-          <p:cNvPr id="132" name="TextBox 131"/>
-          <p:cNvSpPr txBox="1"/>
-          <p:nvPr/>
-        </p:nvSpPr>
-        <p:spPr>
-          <a:xfrm>
-            <a:off x="4683170" y="5591711"/>
-            <a:ext cx="244548" cy="253916"/>
-          </a:xfrm>
-          <a:prstGeom prst="rect">
-            <a:avLst/>
-          </a:prstGeom>
-          <a:noFill/>
-        </p:spPr>
-        <p:txBody>
-          <a:bodyPr wrap="square" rtlCol="0">
-            <a:spAutoFit/>
-          </a:bodyPr>
-          <a:lstStyle/>
-          <a:p>
-            <a:r>
-              <a:rPr lang="en-US" sz="1050" u="sng" dirty="0"/>
-              <a:t>5</a:t>
-            </a:r>
-            <a:endParaRPr lang="en-SG" sz="1050" u="sng" dirty="0"/>
-          </a:p>
-        </p:txBody>
-      </p:sp>
-      <p:cxnSp>
-        <p:nvCxnSpPr>
-          <p:cNvPr id="133" name="Straight Arrow Connector 132"/>
-          <p:cNvCxnSpPr/>
-          <p:nvPr/>
-        </p:nvCxnSpPr>
-        <p:spPr>
-          <a:xfrm>
-            <a:off x="10991850" y="2253743"/>
-            <a:ext cx="0" cy="144000"/>
-          </a:xfrm>
-          <a:prstGeom prst="straightConnector1">
-            <a:avLst/>
-          </a:prstGeom>
-          <a:ln>
-            <a:tailEnd type="triangle"/>
-          </a:ln>
-        </p:spPr>
-        <p:style>
-          <a:lnRef idx="1">
-            <a:schemeClr val="accent1"/>
-          </a:lnRef>
-          <a:fillRef idx="0">
-            <a:schemeClr val="accent1"/>
-          </a:fillRef>
-          <a:effectRef idx="0">
-            <a:schemeClr val="accent1"/>
-          </a:effectRef>
-          <a:fontRef idx="minor">
-            <a:schemeClr val="tx1"/>
-          </a:fontRef>
-        </p:style>
-      </p:cxnSp>
-      <p:cxnSp>
-        <p:nvCxnSpPr>
-          <p:cNvPr id="137" name="Straight Arrow Connector 136"/>
-          <p:cNvCxnSpPr/>
-          <p:nvPr/>
-        </p:nvCxnSpPr>
-        <p:spPr>
-          <a:xfrm flipH="1">
-            <a:off x="10881237" y="3195951"/>
-            <a:ext cx="3073" cy="141570"/>
-          </a:xfrm>
-          <a:prstGeom prst="straightConnector1">
-            <a:avLst/>
-          </a:prstGeom>
-          <a:ln>
-            <a:tailEnd type="triangle"/>
-          </a:ln>
-        </p:spPr>
-        <p:style>
-          <a:lnRef idx="1">
-            <a:schemeClr val="accent1"/>
-          </a:lnRef>
-          <a:fillRef idx="0">
-            <a:schemeClr val="accent1"/>
-          </a:fillRef>
-          <a:effectRef idx="0">
-            <a:schemeClr val="accent1"/>
-          </a:effectRef>
-          <a:fontRef idx="minor">
-            <a:schemeClr val="tx1"/>
-          </a:fontRef>
-        </p:style>
-      </p:cxnSp>
-      <p:sp>
-        <p:nvSpPr>
-          <p:cNvPr id="143" name="Rectangle 142"/>
-          <p:cNvSpPr/>
-          <p:nvPr/>
-        </p:nvSpPr>
-        <p:spPr>
-          <a:xfrm>
-            <a:off x="9118750" y="3289422"/>
-            <a:ext cx="1157767" cy="244238"/>
-          </a:xfrm>
-          <a:prstGeom prst="rect">
-            <a:avLst/>
-          </a:prstGeom>
-        </p:spPr>
-        <p:style>
-          <a:lnRef idx="2">
-            <a:schemeClr val="accent1">
-              <a:shade val="50000"/>
-            </a:schemeClr>
-          </a:lnRef>
-          <a:fillRef idx="1">
-            <a:schemeClr val="accent1"/>
-          </a:fillRef>
-          <a:effectRef idx="0">
-            <a:schemeClr val="accent1"/>
-          </a:effectRef>
-          <a:fontRef idx="minor">
-            <a:schemeClr val="lt1"/>
-          </a:fontRef>
-        </p:style>
-        <p:txBody>
-          <a:bodyPr rtlCol="0" anchor="ctr"/>
-          <a:lstStyle/>
-          <a:p>
-            <a:r>
-              <a:rPr lang="en-US" sz="800" b="1" dirty="0" smtClean="0"/>
-              <a:t>5.1 Decrypt the SWATT feed back </a:t>
-            </a:r>
-            <a:r>
-              <a:rPr lang="en-US" sz="800" b="1" dirty="0" err="1" smtClean="0"/>
-              <a:t>msg</a:t>
-            </a:r>
-            <a:r>
-              <a:rPr lang="en-US" sz="800" b="1" dirty="0" smtClean="0"/>
-              <a:t> </a:t>
-            </a:r>
-            <a:endParaRPr lang="en-SG" sz="800" b="1" dirty="0"/>
-          </a:p>
-        </p:txBody>
-      </p:sp>
-      <p:sp>
-        <p:nvSpPr>
-          <p:cNvPr id="146" name="Rectangle 145"/>
-          <p:cNvSpPr/>
-          <p:nvPr/>
-        </p:nvSpPr>
-        <p:spPr>
-          <a:xfrm>
-            <a:off x="9634941" y="3857486"/>
-            <a:ext cx="2273718" cy="244238"/>
-          </a:xfrm>
-          <a:prstGeom prst="rect">
-            <a:avLst/>
-          </a:prstGeom>
-        </p:spPr>
-        <p:style>
-          <a:lnRef idx="2">
-            <a:schemeClr val="accent1">
-              <a:shade val="50000"/>
-            </a:schemeClr>
-          </a:lnRef>
-          <a:fillRef idx="1">
-            <a:schemeClr val="accent1"/>
-          </a:fillRef>
-          <a:effectRef idx="0">
-            <a:schemeClr val="accent1"/>
-          </a:effectRef>
-          <a:fontRef idx="minor">
-            <a:schemeClr val="lt1"/>
-          </a:fontRef>
-        </p:style>
-        <p:txBody>
-          <a:bodyPr rtlCol="0" anchor="ctr"/>
-          <a:lstStyle/>
-          <a:p>
-            <a:r>
-              <a:rPr lang="en-US" sz="800" b="1" dirty="0" smtClean="0"/>
-              <a:t>6.  Verify the SWATT  value and create the report  </a:t>
-            </a:r>
-            <a:endParaRPr lang="en-SG" sz="800" b="1" dirty="0"/>
-          </a:p>
-        </p:txBody>
-      </p:sp>
-      <p:cxnSp>
-        <p:nvCxnSpPr>
-          <p:cNvPr id="147" name="Straight Arrow Connector 146"/>
-          <p:cNvCxnSpPr/>
-          <p:nvPr/>
-        </p:nvCxnSpPr>
-        <p:spPr>
-          <a:xfrm>
-            <a:off x="9866671" y="3475808"/>
-            <a:ext cx="0" cy="377034"/>
-          </a:xfrm>
-          <a:prstGeom prst="straightConnector1">
-            <a:avLst/>
-          </a:prstGeom>
-          <a:ln>
-            <a:tailEnd type="triangle"/>
-          </a:ln>
-        </p:spPr>
-        <p:style>
-          <a:lnRef idx="1">
-            <a:schemeClr val="accent1"/>
-          </a:lnRef>
-          <a:fillRef idx="0">
-            <a:schemeClr val="accent1"/>
-          </a:fillRef>
-          <a:effectRef idx="0">
-            <a:schemeClr val="accent1"/>
-          </a:effectRef>
-          <a:fontRef idx="minor">
-            <a:schemeClr val="tx1"/>
-          </a:fontRef>
-        </p:style>
-      </p:cxnSp>
-      <p:cxnSp>
-        <p:nvCxnSpPr>
-          <p:cNvPr id="149" name="Straight Arrow Connector 148"/>
-          <p:cNvCxnSpPr/>
-          <p:nvPr/>
-        </p:nvCxnSpPr>
-        <p:spPr>
-          <a:xfrm>
-            <a:off x="10589342" y="3625418"/>
-            <a:ext cx="0" cy="227424"/>
-          </a:xfrm>
-          <a:prstGeom prst="straightConnector1">
-            <a:avLst/>
-          </a:prstGeom>
-          <a:ln>
-            <a:tailEnd type="triangle"/>
-          </a:ln>
-        </p:spPr>
-        <p:style>
-          <a:lnRef idx="1">
-            <a:schemeClr val="accent1"/>
-          </a:lnRef>
-          <a:fillRef idx="0">
-            <a:schemeClr val="accent1"/>
-          </a:fillRef>
-          <a:effectRef idx="0">
-            <a:schemeClr val="accent1"/>
-          </a:effectRef>
-          <a:fontRef idx="minor">
-            <a:schemeClr val="tx1"/>
-          </a:fontRef>
-        </p:style>
-      </p:cxnSp>
-      <p:sp>
-        <p:nvSpPr>
-          <p:cNvPr id="153" name="Rectangle 152"/>
-          <p:cNvSpPr/>
-          <p:nvPr/>
-        </p:nvSpPr>
-        <p:spPr>
-          <a:xfrm>
-            <a:off x="9618807" y="4370971"/>
-            <a:ext cx="2270006" cy="244238"/>
-          </a:xfrm>
-          <a:prstGeom prst="rect">
-            <a:avLst/>
-          </a:prstGeom>
-        </p:spPr>
-        <p:style>
-          <a:lnRef idx="2">
-            <a:schemeClr val="accent1">
-              <a:shade val="50000"/>
-            </a:schemeClr>
-          </a:lnRef>
-          <a:fillRef idx="1">
-            <a:schemeClr val="accent1"/>
-          </a:fillRef>
-          <a:effectRef idx="0">
-            <a:schemeClr val="accent1"/>
-          </a:effectRef>
-          <a:fontRef idx="minor">
-            <a:schemeClr val="lt1"/>
-          </a:fontRef>
-        </p:style>
-        <p:txBody>
-          <a:bodyPr rtlCol="0" anchor="ctr"/>
-          <a:lstStyle/>
-          <a:p>
-            <a:r>
-              <a:rPr lang="en-US" sz="800" b="1" dirty="0" smtClean="0"/>
-              <a:t>6.1. AES Encrypt  the SWATT  value + verify result  </a:t>
-            </a:r>
-            <a:endParaRPr lang="en-SG" sz="800" b="1" dirty="0"/>
-          </a:p>
-        </p:txBody>
-      </p:sp>
-      <p:cxnSp>
-        <p:nvCxnSpPr>
-          <p:cNvPr id="74" name="Straight Arrow Connector 73"/>
-          <p:cNvCxnSpPr/>
-          <p:nvPr/>
-        </p:nvCxnSpPr>
-        <p:spPr>
-          <a:xfrm flipH="1" flipV="1">
-            <a:off x="11820525" y="635135"/>
-            <a:ext cx="0" cy="3190478"/>
-          </a:xfrm>
-          <a:prstGeom prst="straightConnector1">
-            <a:avLst/>
-          </a:prstGeom>
-          <a:ln>
-            <a:tailEnd type="triangle"/>
-          </a:ln>
-        </p:spPr>
-        <p:style>
-          <a:lnRef idx="1">
-            <a:schemeClr val="dk1"/>
-          </a:lnRef>
-          <a:fillRef idx="0">
-            <a:schemeClr val="dk1"/>
-          </a:fillRef>
-          <a:effectRef idx="0">
-            <a:schemeClr val="dk1"/>
-          </a:effectRef>
-          <a:fontRef idx="minor">
-            <a:schemeClr val="tx1"/>
-          </a:fontRef>
-        </p:style>
-      </p:cxnSp>
-      <p:cxnSp>
-        <p:nvCxnSpPr>
-          <p:cNvPr id="156" name="Straight Arrow Connector 155"/>
-          <p:cNvCxnSpPr/>
-          <p:nvPr/>
-        </p:nvCxnSpPr>
-        <p:spPr>
-          <a:xfrm flipH="1">
-            <a:off x="9943839" y="4108203"/>
-            <a:ext cx="8981" cy="256289"/>
-          </a:xfrm>
-          <a:prstGeom prst="straightConnector1">
-            <a:avLst/>
-          </a:prstGeom>
-          <a:ln>
-            <a:tailEnd type="triangle"/>
-          </a:ln>
-        </p:spPr>
-        <p:style>
-          <a:lnRef idx="1">
-            <a:schemeClr val="accent1"/>
-          </a:lnRef>
-          <a:fillRef idx="0">
-            <a:schemeClr val="accent1"/>
-          </a:fillRef>
-          <a:effectRef idx="0">
-            <a:schemeClr val="accent1"/>
-          </a:effectRef>
-          <a:fontRef idx="minor">
-            <a:schemeClr val="tx1"/>
-          </a:fontRef>
-        </p:style>
-      </p:cxnSp>
-      <p:sp>
-        <p:nvSpPr>
-          <p:cNvPr id="158" name="Rectangle 157"/>
-          <p:cNvSpPr/>
-          <p:nvPr/>
-        </p:nvSpPr>
-        <p:spPr>
-          <a:xfrm>
-            <a:off x="5017844" y="3528670"/>
-            <a:ext cx="1746270" cy="249531"/>
-          </a:xfrm>
-          <a:prstGeom prst="rect">
-            <a:avLst/>
-          </a:prstGeom>
-        </p:spPr>
-        <p:style>
-          <a:lnRef idx="2">
-            <a:schemeClr val="accent1">
-              <a:shade val="50000"/>
-            </a:schemeClr>
-          </a:lnRef>
-          <a:fillRef idx="1">
-            <a:schemeClr val="accent1"/>
-          </a:fillRef>
-          <a:effectRef idx="0">
-            <a:schemeClr val="accent1"/>
-          </a:effectRef>
-          <a:fontRef idx="minor">
-            <a:schemeClr val="lt1"/>
-          </a:fontRef>
-        </p:style>
-        <p:txBody>
-          <a:bodyPr rtlCol="0" anchor="ctr"/>
-          <a:lstStyle/>
-          <a:p>
-            <a:r>
-              <a:rPr lang="en-US" sz="800" b="1" dirty="0" smtClean="0"/>
-              <a:t>7. Forward encrypted feedback  </a:t>
-            </a:r>
-            <a:r>
-              <a:rPr lang="en-US" sz="800" b="1" dirty="0" err="1" smtClean="0"/>
-              <a:t>msg</a:t>
-            </a:r>
-            <a:endParaRPr lang="en-SG" sz="800" b="1" dirty="0"/>
-          </a:p>
-        </p:txBody>
-      </p:sp>
-      <p:cxnSp>
-        <p:nvCxnSpPr>
-          <p:cNvPr id="160" name="Elbow Connector 159"/>
-          <p:cNvCxnSpPr>
-            <a:stCxn id="153" idx="1"/>
-            <a:endCxn id="158" idx="3"/>
-          </p:cNvCxnSpPr>
-          <p:nvPr/>
-        </p:nvCxnSpPr>
-        <p:spPr>
-          <a:xfrm rot="10800000">
-            <a:off x="6764115" y="3653436"/>
-            <a:ext cx="2854693" cy="839654"/>
-          </a:xfrm>
-          <a:prstGeom prst="bentConnector3">
-            <a:avLst/>
-          </a:prstGeom>
-          <a:ln>
-            <a:tailEnd type="triangle"/>
-          </a:ln>
-        </p:spPr>
-        <p:style>
-          <a:lnRef idx="1">
-            <a:schemeClr val="accent1"/>
-          </a:lnRef>
-          <a:fillRef idx="0">
-            <a:schemeClr val="accent1"/>
-          </a:fillRef>
-          <a:effectRef idx="0">
-            <a:schemeClr val="accent1"/>
-          </a:effectRef>
-          <a:fontRef idx="minor">
-            <a:schemeClr val="tx1"/>
-          </a:fontRef>
-        </p:style>
-      </p:cxnSp>
-      <p:cxnSp>
-        <p:nvCxnSpPr>
-          <p:cNvPr id="161" name="Straight Arrow Connector 160"/>
-          <p:cNvCxnSpPr/>
-          <p:nvPr/>
-        </p:nvCxnSpPr>
-        <p:spPr>
-          <a:xfrm flipH="1">
-            <a:off x="5251740" y="3797869"/>
-            <a:ext cx="0" cy="2330572"/>
-          </a:xfrm>
-          <a:prstGeom prst="straightConnector1">
-            <a:avLst/>
-          </a:prstGeom>
-          <a:ln>
-            <a:tailEnd type="triangle"/>
-          </a:ln>
-        </p:spPr>
-        <p:style>
-          <a:lnRef idx="1">
-            <a:schemeClr val="dk1"/>
-          </a:lnRef>
-          <a:fillRef idx="0">
-            <a:schemeClr val="dk1"/>
-          </a:fillRef>
-          <a:effectRef idx="0">
-            <a:schemeClr val="dk1"/>
-          </a:effectRef>
-          <a:fontRef idx="minor">
-            <a:schemeClr val="tx1"/>
-          </a:fontRef>
-        </p:style>
-      </p:cxnSp>
-      <p:sp>
-        <p:nvSpPr>
-          <p:cNvPr id="164" name="TextBox 163"/>
-          <p:cNvSpPr txBox="1"/>
-          <p:nvPr/>
-        </p:nvSpPr>
-        <p:spPr>
-          <a:xfrm>
-            <a:off x="5064944" y="5590231"/>
-            <a:ext cx="244548" cy="253916"/>
-          </a:xfrm>
-          <a:prstGeom prst="rect">
-            <a:avLst/>
-          </a:prstGeom>
-          <a:noFill/>
-        </p:spPr>
-        <p:txBody>
-          <a:bodyPr wrap="square" rtlCol="0">
-            <a:spAutoFit/>
-          </a:bodyPr>
-          <a:lstStyle/>
-          <a:p>
-            <a:r>
-              <a:rPr lang="en-US" sz="1050" u="sng" dirty="0" smtClean="0"/>
-              <a:t>7</a:t>
-            </a:r>
-            <a:endParaRPr lang="en-SG" sz="1050" u="sng" dirty="0"/>
-          </a:p>
-        </p:txBody>
-      </p:sp>
-      <p:sp>
-        <p:nvSpPr>
-          <p:cNvPr id="166" name="Rectangle 165"/>
-          <p:cNvSpPr/>
-          <p:nvPr/>
-        </p:nvSpPr>
-        <p:spPr>
-          <a:xfrm>
-            <a:off x="5398891" y="3866269"/>
-            <a:ext cx="1805591" cy="602836"/>
-          </a:xfrm>
-          <a:prstGeom prst="rect">
-            <a:avLst/>
-          </a:prstGeom>
-        </p:spPr>
-        <p:style>
-          <a:lnRef idx="2">
-            <a:schemeClr val="accent1">
-              <a:shade val="50000"/>
-            </a:schemeClr>
-          </a:lnRef>
-          <a:fillRef idx="1">
-            <a:schemeClr val="accent1"/>
-          </a:fillRef>
-          <a:effectRef idx="0">
-            <a:schemeClr val="accent1"/>
-          </a:effectRef>
-          <a:fontRef idx="minor">
-            <a:schemeClr val="lt1"/>
-          </a:fontRef>
-        </p:style>
-        <p:txBody>
-          <a:bodyPr rtlCol="0" anchor="ctr"/>
-          <a:lstStyle/>
-          <a:p>
-            <a:r>
-              <a:rPr lang="en-US" sz="800" b="1" dirty="0" smtClean="0"/>
-              <a:t>7.1 Load verification result</a:t>
-            </a:r>
-          </a:p>
-          <a:p>
-            <a:r>
-              <a:rPr lang="en-US" sz="800" b="1" dirty="0"/>
-              <a:t> </a:t>
-            </a:r>
-            <a:r>
-              <a:rPr lang="en-US" sz="800" b="1" dirty="0" smtClean="0"/>
-              <a:t>- Verify success =&gt; Terminate </a:t>
-            </a:r>
-          </a:p>
-          <a:p>
-            <a:r>
-              <a:rPr lang="en-US" sz="800" b="1" dirty="0" smtClean="0"/>
-              <a:t>-  Verify failed =&gt; Remove the checked program. ( or return to step 2 ) </a:t>
-            </a:r>
-          </a:p>
-          <a:p>
-            <a:r>
-              <a:rPr lang="en-US" sz="800" b="1" dirty="0" smtClean="0"/>
-              <a:t> </a:t>
-            </a:r>
-            <a:endParaRPr lang="en-SG" sz="800" b="1" dirty="0"/>
-          </a:p>
-        </p:txBody>
-      </p:sp>
-      <p:cxnSp>
-        <p:nvCxnSpPr>
-          <p:cNvPr id="167" name="Straight Arrow Connector 166"/>
-          <p:cNvCxnSpPr/>
-          <p:nvPr/>
-        </p:nvCxnSpPr>
-        <p:spPr>
-          <a:xfrm flipV="1">
-            <a:off x="5592227" y="4493091"/>
-            <a:ext cx="0" cy="1647509"/>
-          </a:xfrm>
-          <a:prstGeom prst="straightConnector1">
-            <a:avLst/>
-          </a:prstGeom>
-          <a:ln>
-            <a:tailEnd type="triangle"/>
-          </a:ln>
-        </p:spPr>
-        <p:style>
-          <a:lnRef idx="1">
-            <a:schemeClr val="dk1"/>
-          </a:lnRef>
-          <a:fillRef idx="0">
-            <a:schemeClr val="dk1"/>
-          </a:fillRef>
-          <a:effectRef idx="0">
-            <a:schemeClr val="dk1"/>
-          </a:effectRef>
-          <a:fontRef idx="minor">
-            <a:schemeClr val="tx1"/>
-          </a:fontRef>
-        </p:style>
-      </p:cxnSp>
-      <p:sp>
-        <p:nvSpPr>
-          <p:cNvPr id="171" name="TextBox 170"/>
-          <p:cNvSpPr txBox="1"/>
-          <p:nvPr/>
-        </p:nvSpPr>
-        <p:spPr>
-          <a:xfrm>
-            <a:off x="5332492" y="5609281"/>
-            <a:ext cx="405661" cy="253916"/>
-          </a:xfrm>
-          <a:prstGeom prst="rect">
-            <a:avLst/>
-          </a:prstGeom>
-          <a:noFill/>
-        </p:spPr>
-        <p:txBody>
-          <a:bodyPr wrap="square" rtlCol="0">
-            <a:spAutoFit/>
-          </a:bodyPr>
-          <a:lstStyle/>
-          <a:p>
-            <a:r>
-              <a:rPr lang="en-US" sz="1050" u="sng" dirty="0" smtClean="0"/>
-              <a:t>7.1</a:t>
-            </a:r>
-            <a:endParaRPr lang="en-SG" sz="1050" u="sng" dirty="0"/>
-          </a:p>
-        </p:txBody>
-      </p:sp>
-      <p:sp>
-        <p:nvSpPr>
-          <p:cNvPr id="177" name="Rectangle 176"/>
-          <p:cNvSpPr/>
-          <p:nvPr/>
-        </p:nvSpPr>
-        <p:spPr>
-          <a:xfrm>
-            <a:off x="7988106" y="329051"/>
-            <a:ext cx="1026563" cy="369332"/>
-          </a:xfrm>
-          <a:prstGeom prst="rect">
-            <a:avLst/>
-          </a:prstGeom>
-        </p:spPr>
-        <p:txBody>
-          <a:bodyPr wrap="none">
-            <a:spAutoFit/>
-          </a:bodyPr>
-          <a:lstStyle/>
-          <a:p>
-            <a:r>
-              <a:rPr lang="en-US" dirty="0" err="1" smtClean="0"/>
-              <a:t>NetWork</a:t>
-            </a:r>
-            <a:endParaRPr lang="en-SG" dirty="0"/>
-          </a:p>
-        </p:txBody>
-      </p:sp>
-      <p:sp>
-        <p:nvSpPr>
-          <p:cNvPr id="73" name="Rectangle 72"/>
-          <p:cNvSpPr/>
-          <p:nvPr/>
-        </p:nvSpPr>
-        <p:spPr>
-          <a:xfrm>
-            <a:off x="5707380" y="4808398"/>
-            <a:ext cx="1458632" cy="476521"/>
-          </a:xfrm>
-          <a:prstGeom prst="rect">
-            <a:avLst/>
-          </a:prstGeom>
-        </p:spPr>
-        <p:style>
-          <a:lnRef idx="2">
-            <a:schemeClr val="accent1">
-              <a:shade val="50000"/>
-            </a:schemeClr>
-          </a:lnRef>
-          <a:fillRef idx="1">
-            <a:schemeClr val="accent1"/>
-          </a:fillRef>
-          <a:effectRef idx="0">
-            <a:schemeClr val="accent1"/>
-          </a:effectRef>
-          <a:fontRef idx="minor">
-            <a:schemeClr val="lt1"/>
-          </a:fontRef>
-        </p:style>
-        <p:txBody>
-          <a:bodyPr rtlCol="0" anchor="ctr"/>
-          <a:lstStyle/>
-          <a:p>
-            <a:r>
-              <a:rPr lang="en-US" sz="800" b="1" dirty="0" smtClean="0"/>
-              <a:t>8. Check the program running status , System library usage and (memory usage ), encrypt message </a:t>
-            </a:r>
-            <a:endParaRPr lang="en-SG" sz="800" b="1" dirty="0"/>
-          </a:p>
-        </p:txBody>
-      </p:sp>
-      <p:cxnSp>
-        <p:nvCxnSpPr>
-          <p:cNvPr id="3" name="Straight Arrow Connector 2"/>
-          <p:cNvCxnSpPr/>
-          <p:nvPr/>
-        </p:nvCxnSpPr>
-        <p:spPr>
-          <a:xfrm>
-            <a:off x="6057045" y="4478928"/>
-            <a:ext cx="0" cy="329470"/>
-          </a:xfrm>
-          <a:prstGeom prst="straightConnector1">
-            <a:avLst/>
-          </a:prstGeom>
-          <a:ln>
-            <a:tailEnd type="triangle"/>
-          </a:ln>
-        </p:spPr>
-        <p:style>
-          <a:lnRef idx="1">
-            <a:schemeClr val="accent1"/>
-          </a:lnRef>
-          <a:fillRef idx="0">
-            <a:schemeClr val="accent1"/>
-          </a:fillRef>
-          <a:effectRef idx="0">
-            <a:schemeClr val="accent1"/>
-          </a:effectRef>
-          <a:fontRef idx="minor">
-            <a:schemeClr val="tx1"/>
-          </a:fontRef>
-        </p:style>
-      </p:cxnSp>
-      <p:cxnSp>
-        <p:nvCxnSpPr>
-          <p:cNvPr id="6" name="Straight Arrow Connector 5"/>
-          <p:cNvCxnSpPr>
-            <a:stCxn id="73" idx="3"/>
-          </p:cNvCxnSpPr>
-          <p:nvPr/>
-        </p:nvCxnSpPr>
-        <p:spPr>
-          <a:xfrm flipV="1">
-            <a:off x="7166012" y="5034013"/>
-            <a:ext cx="2406015" cy="12646"/>
-          </a:xfrm>
-          <a:prstGeom prst="straightConnector1">
-            <a:avLst/>
-          </a:prstGeom>
-          <a:ln>
-            <a:tailEnd type="triangle"/>
-          </a:ln>
-        </p:spPr>
-        <p:style>
-          <a:lnRef idx="1">
-            <a:schemeClr val="accent1"/>
-          </a:lnRef>
-          <a:fillRef idx="0">
-            <a:schemeClr val="accent1"/>
-          </a:fillRef>
-          <a:effectRef idx="0">
-            <a:schemeClr val="accent1"/>
-          </a:effectRef>
-          <a:fontRef idx="minor">
-            <a:schemeClr val="tx1"/>
-          </a:fontRef>
-        </p:style>
-      </p:cxnSp>
-      <p:sp>
-        <p:nvSpPr>
-          <p:cNvPr id="78" name="Rectangle 77"/>
-          <p:cNvSpPr/>
-          <p:nvPr/>
-        </p:nvSpPr>
-        <p:spPr>
-          <a:xfrm>
-            <a:off x="9616493" y="4899767"/>
-            <a:ext cx="2385452" cy="244238"/>
-          </a:xfrm>
-          <a:prstGeom prst="rect">
-            <a:avLst/>
-          </a:prstGeom>
-        </p:spPr>
-        <p:style>
-          <a:lnRef idx="2">
-            <a:schemeClr val="accent1">
-              <a:shade val="50000"/>
-            </a:schemeClr>
-          </a:lnRef>
-          <a:fillRef idx="1">
-            <a:schemeClr val="accent1"/>
-          </a:fillRef>
-          <a:effectRef idx="0">
-            <a:schemeClr val="accent1"/>
-          </a:effectRef>
-          <a:fontRef idx="minor">
-            <a:schemeClr val="lt1"/>
-          </a:fontRef>
-        </p:style>
-        <p:txBody>
-          <a:bodyPr rtlCol="0" anchor="ctr"/>
-          <a:lstStyle/>
-          <a:p>
-            <a:r>
-              <a:rPr lang="en-US" sz="800" b="1" dirty="0"/>
-              <a:t>8</a:t>
-            </a:r>
-            <a:r>
-              <a:rPr lang="en-US" sz="800" b="1" dirty="0" smtClean="0"/>
-              <a:t>.  Decrypt the message  and save the </a:t>
-            </a:r>
-            <a:r>
-              <a:rPr lang="en-US" sz="800" b="1" dirty="0"/>
-              <a:t>program running</a:t>
-            </a:r>
-            <a:r>
-              <a:rPr lang="en-US" sz="800" b="1" dirty="0" smtClean="0"/>
-              <a:t> data. </a:t>
-            </a:r>
-            <a:endParaRPr lang="en-SG" sz="800" b="1" dirty="0"/>
-          </a:p>
-        </p:txBody>
-      </p:sp>
-      <p:cxnSp>
-        <p:nvCxnSpPr>
-          <p:cNvPr id="80" name="Straight Arrow Connector 79"/>
-          <p:cNvCxnSpPr/>
-          <p:nvPr/>
-        </p:nvCxnSpPr>
-        <p:spPr>
-          <a:xfrm flipH="1" flipV="1">
-            <a:off x="11597540" y="635134"/>
-            <a:ext cx="0" cy="4264633"/>
-          </a:xfrm>
-          <a:prstGeom prst="straightConnector1">
-            <a:avLst/>
-          </a:prstGeom>
-          <a:ln>
-            <a:tailEnd type="triangle"/>
-          </a:ln>
-        </p:spPr>
-        <p:style>
-          <a:lnRef idx="1">
-            <a:schemeClr val="dk1"/>
-          </a:lnRef>
-          <a:fillRef idx="0">
-            <a:schemeClr val="dk1"/>
-          </a:fillRef>
-          <a:effectRef idx="0">
-            <a:schemeClr val="dk1"/>
-          </a:effectRef>
-          <a:fontRef idx="minor">
-            <a:schemeClr val="tx1"/>
-          </a:fontRef>
-        </p:style>
-      </p:cxnSp>
-      <p:cxnSp>
-        <p:nvCxnSpPr>
-          <p:cNvPr id="9" name="Straight Arrow Connector 8"/>
-          <p:cNvCxnSpPr/>
-          <p:nvPr/>
-        </p:nvCxnSpPr>
-        <p:spPr>
-          <a:xfrm>
-            <a:off x="6288445" y="5297177"/>
-            <a:ext cx="0" cy="847741"/>
-          </a:xfrm>
-          <a:prstGeom prst="straightConnector1">
-            <a:avLst/>
-          </a:prstGeom>
-          <a:ln>
-            <a:headEnd type="triangle"/>
-            <a:tailEnd type="triangle"/>
-          </a:ln>
-        </p:spPr>
-        <p:style>
-          <a:lnRef idx="1">
-            <a:schemeClr val="dk1"/>
-          </a:lnRef>
-          <a:fillRef idx="0">
-            <a:schemeClr val="dk1"/>
-          </a:fillRef>
-          <a:effectRef idx="0">
-            <a:schemeClr val="dk1"/>
-          </a:effectRef>
-          <a:fontRef idx="minor">
-            <a:schemeClr val="tx1"/>
-          </a:fontRef>
-        </p:style>
-      </p:cxnSp>
-      <p:sp>
-        <p:nvSpPr>
-          <p:cNvPr id="86" name="TextBox 85"/>
-          <p:cNvSpPr txBox="1"/>
-          <p:nvPr/>
-        </p:nvSpPr>
-        <p:spPr>
-          <a:xfrm>
-            <a:off x="6094454" y="5618913"/>
-            <a:ext cx="244548" cy="253916"/>
-          </a:xfrm>
-          <a:prstGeom prst="rect">
-            <a:avLst/>
-          </a:prstGeom>
-          <a:noFill/>
-        </p:spPr>
-        <p:txBody>
-          <a:bodyPr wrap="square" rtlCol="0">
-            <a:spAutoFit/>
-          </a:bodyPr>
-          <a:lstStyle/>
-          <a:p>
-            <a:r>
-              <a:rPr lang="en-US" sz="1050" u="sng" dirty="0"/>
-              <a:t>8</a:t>
-            </a:r>
-            <a:endParaRPr lang="en-SG" sz="1050" u="sng" dirty="0"/>
-          </a:p>
-        </p:txBody>
-      </p:sp>
-      <p:sp>
-        <p:nvSpPr>
-          <p:cNvPr id="91" name="TextBox 90"/>
-          <p:cNvSpPr txBox="1"/>
-          <p:nvPr/>
-        </p:nvSpPr>
-        <p:spPr>
-          <a:xfrm>
-            <a:off x="9043393" y="2203267"/>
-            <a:ext cx="1303562" cy="215444"/>
-          </a:xfrm>
-          <a:prstGeom prst="rect">
-            <a:avLst/>
-          </a:prstGeom>
-          <a:noFill/>
-        </p:spPr>
-        <p:txBody>
-          <a:bodyPr wrap="square" rtlCol="0">
-            <a:spAutoFit/>
-          </a:bodyPr>
-          <a:lstStyle/>
-          <a:p>
-            <a:r>
-              <a:rPr lang="en-US" sz="800" dirty="0" smtClean="0"/>
-              <a:t>Encrypted AES session key</a:t>
-            </a:r>
-            <a:endParaRPr lang="en-SG" sz="800" dirty="0"/>
-          </a:p>
-        </p:txBody>
-      </p:sp>
-      <p:sp>
-        <p:nvSpPr>
-          <p:cNvPr id="92" name="Rectangle 91"/>
-          <p:cNvSpPr/>
-          <p:nvPr/>
-        </p:nvSpPr>
-        <p:spPr>
-          <a:xfrm>
-            <a:off x="6054369" y="2476026"/>
-            <a:ext cx="1465439" cy="249531"/>
-          </a:xfrm>
-          <a:prstGeom prst="rect">
-            <a:avLst/>
-          </a:prstGeom>
-        </p:spPr>
-        <p:style>
-          <a:lnRef idx="2">
-            <a:schemeClr val="accent1">
-              <a:shade val="50000"/>
-            </a:schemeClr>
-          </a:lnRef>
-          <a:fillRef idx="1">
-            <a:schemeClr val="accent1"/>
-          </a:fillRef>
-          <a:effectRef idx="0">
-            <a:schemeClr val="accent1"/>
-          </a:effectRef>
-          <a:fontRef idx="minor">
-            <a:schemeClr val="lt1"/>
-          </a:fontRef>
-        </p:style>
-        <p:txBody>
-          <a:bodyPr rtlCol="0" anchor="ctr"/>
-          <a:lstStyle/>
-          <a:p>
-            <a:r>
-              <a:rPr lang="en-US" sz="800" b="1" u="sng" dirty="0" smtClean="0">
-                <a:solidFill>
-                  <a:srgbClr val="C00000"/>
-                </a:solidFill>
-              </a:rPr>
-              <a:t>2.3 Session key setup confirm</a:t>
-            </a:r>
-            <a:endParaRPr lang="en-SG" sz="800" b="1" u="sng" dirty="0">
-              <a:solidFill>
-                <a:srgbClr val="C00000"/>
-              </a:solidFill>
-            </a:endParaRPr>
-          </a:p>
-        </p:txBody>
-      </p:sp>
-      <p:cxnSp>
-        <p:nvCxnSpPr>
-          <p:cNvPr id="93" name="Straight Arrow Connector 92"/>
-          <p:cNvCxnSpPr/>
-          <p:nvPr/>
-        </p:nvCxnSpPr>
-        <p:spPr>
-          <a:xfrm>
-            <a:off x="7526831" y="2532271"/>
-            <a:ext cx="1808898" cy="94"/>
-          </a:xfrm>
-          <a:prstGeom prst="straightConnector1">
-            <a:avLst/>
-          </a:prstGeom>
-          <a:ln>
-            <a:tailEnd type="triangle"/>
-          </a:ln>
-        </p:spPr>
-        <p:style>
-          <a:lnRef idx="1">
-            <a:schemeClr val="accent1"/>
-          </a:lnRef>
-          <a:fillRef idx="0">
-            <a:schemeClr val="accent1"/>
-          </a:fillRef>
-          <a:effectRef idx="0">
-            <a:schemeClr val="accent1"/>
-          </a:effectRef>
-          <a:fontRef idx="minor">
-            <a:schemeClr val="tx1"/>
-          </a:fontRef>
-        </p:style>
-      </p:cxnSp>
-      <p:sp>
-        <p:nvSpPr>
-          <p:cNvPr id="101" name="Rectangle 100"/>
-          <p:cNvSpPr/>
-          <p:nvPr/>
-        </p:nvSpPr>
-        <p:spPr>
-          <a:xfrm>
-            <a:off x="9354845" y="2454054"/>
-            <a:ext cx="2097278" cy="249215"/>
-          </a:xfrm>
-          <a:prstGeom prst="rect">
-            <a:avLst/>
-          </a:prstGeom>
-        </p:spPr>
-        <p:style>
-          <a:lnRef idx="2">
-            <a:schemeClr val="accent1">
-              <a:shade val="50000"/>
-            </a:schemeClr>
-          </a:lnRef>
-          <a:fillRef idx="1">
-            <a:schemeClr val="accent1"/>
-          </a:fillRef>
-          <a:effectRef idx="0">
-            <a:schemeClr val="accent1"/>
-          </a:effectRef>
-          <a:fontRef idx="minor">
-            <a:schemeClr val="lt1"/>
-          </a:fontRef>
-        </p:style>
-        <p:txBody>
-          <a:bodyPr rtlCol="0" anchor="ctr"/>
-          <a:lstStyle/>
-          <a:p>
-            <a:r>
-              <a:rPr lang="en-US" sz="800" b="1" u="sng" dirty="0" smtClean="0">
-                <a:solidFill>
-                  <a:srgbClr val="C00000"/>
-                </a:solidFill>
-              </a:rPr>
-              <a:t>2.3 Create the random </a:t>
-            </a:r>
-            <a:r>
-              <a:rPr lang="en-US" sz="800" b="1" u="sng" dirty="0" err="1" smtClean="0">
-                <a:solidFill>
-                  <a:srgbClr val="C00000"/>
-                </a:solidFill>
-              </a:rPr>
-              <a:t>Swatt</a:t>
-            </a:r>
-            <a:r>
-              <a:rPr lang="en-US" sz="800" b="1" u="sng" dirty="0" smtClean="0">
-                <a:solidFill>
-                  <a:srgbClr val="C00000"/>
-                </a:solidFill>
-              </a:rPr>
-              <a:t> Challenge string based on the </a:t>
-            </a:r>
-            <a:r>
-              <a:rPr lang="en-US" sz="800" b="1" u="sng" dirty="0" err="1" smtClean="0">
-                <a:solidFill>
-                  <a:srgbClr val="C00000"/>
-                </a:solidFill>
-              </a:rPr>
-              <a:t>C_len</a:t>
-            </a:r>
-            <a:r>
-              <a:rPr lang="en-US" sz="800" b="1" u="sng" dirty="0" smtClean="0">
-                <a:solidFill>
-                  <a:srgbClr val="C00000"/>
-                </a:solidFill>
-              </a:rPr>
-              <a:t> and encrypted the msg.</a:t>
-            </a:r>
-            <a:endParaRPr lang="en-SG" sz="800" b="1" u="sng" dirty="0">
-              <a:solidFill>
-                <a:srgbClr val="C00000"/>
-              </a:solidFill>
-            </a:endParaRPr>
-          </a:p>
-        </p:txBody>
-      </p:sp>
-      <p:cxnSp>
-        <p:nvCxnSpPr>
-          <p:cNvPr id="102" name="Straight Arrow Connector 101"/>
-          <p:cNvCxnSpPr/>
-          <p:nvPr/>
-        </p:nvCxnSpPr>
-        <p:spPr>
-          <a:xfrm>
-            <a:off x="6747773" y="2310054"/>
-            <a:ext cx="0" cy="144000"/>
-          </a:xfrm>
-          <a:prstGeom prst="straightConnector1">
-            <a:avLst/>
-          </a:prstGeom>
-          <a:ln>
-            <a:tailEnd type="triangle"/>
-          </a:ln>
-        </p:spPr>
-        <p:style>
-          <a:lnRef idx="1">
-            <a:schemeClr val="accent1"/>
-          </a:lnRef>
-          <a:fillRef idx="0">
-            <a:schemeClr val="accent1"/>
-          </a:fillRef>
-          <a:effectRef idx="0">
-            <a:schemeClr val="accent1"/>
-          </a:effectRef>
-          <a:fontRef idx="minor">
-            <a:schemeClr val="tx1"/>
-          </a:fontRef>
-        </p:style>
-      </p:cxnSp>
-      <p:cxnSp>
-        <p:nvCxnSpPr>
-          <p:cNvPr id="104" name="Straight Arrow Connector 103"/>
-          <p:cNvCxnSpPr/>
-          <p:nvPr/>
-        </p:nvCxnSpPr>
-        <p:spPr>
-          <a:xfrm flipH="1">
-            <a:off x="10882456" y="2752449"/>
-            <a:ext cx="3073" cy="141570"/>
-          </a:xfrm>
-          <a:prstGeom prst="straightConnector1">
-            <a:avLst/>
-          </a:prstGeom>
-          <a:ln>
-            <a:tailEnd type="triangle"/>
-          </a:ln>
-        </p:spPr>
-        <p:style>
-          <a:lnRef idx="1">
-            <a:schemeClr val="accent1"/>
-          </a:lnRef>
-          <a:fillRef idx="0">
-            <a:schemeClr val="accent1"/>
-          </a:fillRef>
-          <a:effectRef idx="0">
-            <a:schemeClr val="accent1"/>
-          </a:effectRef>
-          <a:fontRef idx="minor">
-            <a:schemeClr val="tx1"/>
-          </a:fontRef>
-        </p:style>
-      </p:cxnSp>
-      <p:cxnSp>
-        <p:nvCxnSpPr>
-          <p:cNvPr id="26" name="Elbow Connector 25"/>
-          <p:cNvCxnSpPr/>
-          <p:nvPr/>
-        </p:nvCxnSpPr>
-        <p:spPr>
-          <a:xfrm rot="10800000" flipV="1">
-            <a:off x="7388208" y="2701484"/>
-            <a:ext cx="2731767" cy="277612"/>
-          </a:xfrm>
-          <a:prstGeom prst="bentConnector3">
-            <a:avLst>
-              <a:gd name="adj1" fmla="val 8699"/>
-            </a:avLst>
-          </a:prstGeom>
-          <a:ln>
-            <a:tailEnd type="triangle"/>
-          </a:ln>
-        </p:spPr>
-        <p:style>
-          <a:lnRef idx="1">
-            <a:schemeClr val="accent1"/>
-          </a:lnRef>
-          <a:fillRef idx="0">
-            <a:schemeClr val="accent1"/>
-          </a:fillRef>
-          <a:effectRef idx="0">
-            <a:schemeClr val="accent1"/>
-          </a:effectRef>
-          <a:fontRef idx="minor">
-            <a:schemeClr val="tx1"/>
-          </a:fontRef>
-        </p:style>
-      </p:cxnSp>
-      <p:sp>
-        <p:nvSpPr>
-          <p:cNvPr id="107" name="Rectangle 106"/>
-          <p:cNvSpPr/>
-          <p:nvPr/>
-        </p:nvSpPr>
-        <p:spPr>
-          <a:xfrm>
-            <a:off x="5372377" y="2871658"/>
-            <a:ext cx="2014087" cy="249531"/>
-          </a:xfrm>
-          <a:prstGeom prst="rect">
-            <a:avLst/>
-          </a:prstGeom>
-        </p:spPr>
-        <p:style>
-          <a:lnRef idx="2">
-            <a:schemeClr val="accent1">
-              <a:shade val="50000"/>
-            </a:schemeClr>
-          </a:lnRef>
-          <a:fillRef idx="1">
-            <a:schemeClr val="accent1"/>
-          </a:fillRef>
-          <a:effectRef idx="0">
-            <a:schemeClr val="accent1"/>
-          </a:effectRef>
-          <a:fontRef idx="minor">
-            <a:schemeClr val="lt1"/>
-          </a:fontRef>
-        </p:style>
-        <p:txBody>
-          <a:bodyPr rtlCol="0" anchor="ctr"/>
-          <a:lstStyle/>
-          <a:p>
-            <a:r>
-              <a:rPr lang="en-US" sz="800" b="1" u="sng" dirty="0" smtClean="0">
-                <a:solidFill>
-                  <a:srgbClr val="C00000"/>
-                </a:solidFill>
-              </a:rPr>
-              <a:t>2.3 Forward challenge string </a:t>
-            </a:r>
-            <a:r>
-              <a:rPr lang="en-US" sz="800" b="1" u="sng" dirty="0" err="1" smtClean="0">
-                <a:solidFill>
-                  <a:srgbClr val="C00000"/>
-                </a:solidFill>
-              </a:rPr>
-              <a:t>msg</a:t>
-            </a:r>
-            <a:r>
-              <a:rPr lang="en-US" sz="800" b="1" u="sng" dirty="0" smtClean="0">
-                <a:solidFill>
-                  <a:srgbClr val="C00000"/>
-                </a:solidFill>
-              </a:rPr>
-              <a:t> to TA </a:t>
-            </a:r>
-            <a:endParaRPr lang="en-SG" sz="800" b="1" u="sng" dirty="0">
-              <a:solidFill>
-                <a:srgbClr val="C00000"/>
-              </a:solidFill>
-            </a:endParaRPr>
-          </a:p>
-        </p:txBody>
-      </p:sp>
-      <p:cxnSp>
-        <p:nvCxnSpPr>
-          <p:cNvPr id="108" name="Straight Arrow Connector 107"/>
-          <p:cNvCxnSpPr/>
-          <p:nvPr/>
-        </p:nvCxnSpPr>
-        <p:spPr>
-          <a:xfrm>
-            <a:off x="7285703" y="3121189"/>
-            <a:ext cx="0" cy="3028888"/>
-          </a:xfrm>
-          <a:prstGeom prst="straightConnector1">
-            <a:avLst/>
-          </a:prstGeom>
-          <a:ln>
-            <a:tailEnd type="triangle"/>
-          </a:ln>
-        </p:spPr>
-        <p:style>
-          <a:lnRef idx="1">
-            <a:schemeClr val="dk1"/>
-          </a:lnRef>
-          <a:fillRef idx="0">
-            <a:schemeClr val="dk1"/>
-          </a:fillRef>
-          <a:effectRef idx="0">
-            <a:schemeClr val="dk1"/>
-          </a:effectRef>
-          <a:fontRef idx="minor">
-            <a:schemeClr val="tx1"/>
-          </a:fontRef>
-        </p:style>
-      </p:cxnSp>
-      <p:sp>
-        <p:nvSpPr>
-          <p:cNvPr id="114" name="TextBox 113"/>
-          <p:cNvSpPr txBox="1"/>
-          <p:nvPr/>
-        </p:nvSpPr>
-        <p:spPr>
-          <a:xfrm>
-            <a:off x="7075357" y="5625425"/>
-            <a:ext cx="244548" cy="253916"/>
-          </a:xfrm>
-          <a:prstGeom prst="rect">
-            <a:avLst/>
-          </a:prstGeom>
-          <a:noFill/>
-        </p:spPr>
-        <p:txBody>
-          <a:bodyPr wrap="square" rtlCol="0">
-            <a:spAutoFit/>
-          </a:bodyPr>
-          <a:lstStyle/>
-          <a:p>
-            <a:r>
-              <a:rPr lang="en-US" sz="1050" b="1" u="sng" dirty="0">
-                <a:solidFill>
-                  <a:srgbClr val="C00000"/>
-                </a:solidFill>
-              </a:rPr>
-              <a:t>2</a:t>
-            </a:r>
-            <a:endParaRPr lang="en-SG" sz="1050" b="1" u="sng" dirty="0">
-              <a:solidFill>
-                <a:srgbClr val="C00000"/>
-              </a:solidFill>
-            </a:endParaRPr>
-          </a:p>
-        </p:txBody>
-      </p:sp>
-      <p:sp>
-        <p:nvSpPr>
-          <p:cNvPr id="2" name="Rectangle 1"/>
-          <p:cNvSpPr/>
-          <p:nvPr/>
-        </p:nvSpPr>
-        <p:spPr>
-          <a:xfrm>
-            <a:off x="5172334" y="1467122"/>
-            <a:ext cx="6933634" cy="1835271"/>
-          </a:xfrm>
-          <a:prstGeom prst="rect">
-            <a:avLst/>
-          </a:prstGeom>
-          <a:noFill/>
-          <a:ln w="28575">
-            <a:solidFill>
-              <a:srgbClr val="C00000"/>
-            </a:solidFill>
-            <a:prstDash val="dash"/>
-          </a:ln>
-        </p:spPr>
-        <p:style>
-          <a:lnRef idx="2">
-            <a:schemeClr val="accent1">
-              <a:shade val="50000"/>
-            </a:schemeClr>
-          </a:lnRef>
-          <a:fillRef idx="1">
-            <a:schemeClr val="accent1"/>
-          </a:fillRef>
-          <a:effectRef idx="0">
-            <a:schemeClr val="accent1"/>
-          </a:effectRef>
-          <a:fontRef idx="minor">
-            <a:schemeClr val="lt1"/>
-          </a:fontRef>
-        </p:style>
-        <p:txBody>
-          <a:bodyPr rtlCol="0" anchor="ctr"/>
-          <a:lstStyle/>
-          <a:p>
-            <a:pPr algn="ctr"/>
-            <a:endParaRPr lang="en-SG"/>
+              <a:rPr lang="en-SG" sz="1600" b="1" dirty="0"/>
+              <a:t>3</a:t>
+            </a:r>
+            <a:r>
+              <a:rPr lang="en-SG" sz="1600" b="1" dirty="0" smtClean="0"/>
+              <a:t>. </a:t>
+            </a:r>
+            <a:r>
+              <a:rPr lang="en-US" sz="1600" b="1" dirty="0"/>
+              <a:t>Secure </a:t>
+            </a:r>
+            <a:r>
+              <a:rPr lang="en-US" sz="1600" b="1" dirty="0" err="1"/>
+              <a:t>IoT</a:t>
+            </a:r>
+            <a:r>
+              <a:rPr lang="en-US" sz="1600" b="1" dirty="0"/>
+              <a:t> Software Supply Chain</a:t>
+            </a:r>
+            <a:endParaRPr lang="en-SG" sz="1600" b="1" dirty="0"/>
           </a:p>
         </p:txBody>
       </p:sp>
     </p:spTree>
     <p:extLst>
       <p:ext uri="{BB962C8B-B14F-4D97-AF65-F5344CB8AC3E}">
-        <p14:creationId xmlns:p14="http://schemas.microsoft.com/office/powerpoint/2010/main" val="3391187816"/>
+        <p14:creationId xmlns:p14="http://schemas.microsoft.com/office/powerpoint/2010/main" val="980635837"/>
       </p:ext>
     </p:extLst>
   </p:cSld>

</xml_diff>